<commit_message>
slight changes in the ppt is made
</commit_message>
<xml_diff>
--- a/React-Redux Tutorial.pptx
+++ b/React-Redux Tutorial.pptx
@@ -7,11 +7,12 @@
   <p:sldIdLst>
     <p:sldId id="256" r:id="rId2"/>
     <p:sldId id="257" r:id="rId3"/>
-    <p:sldId id="258" r:id="rId4"/>
-    <p:sldId id="259" r:id="rId5"/>
-    <p:sldId id="260" r:id="rId6"/>
-    <p:sldId id="261" r:id="rId7"/>
-    <p:sldId id="262" r:id="rId8"/>
+    <p:sldId id="263" r:id="rId4"/>
+    <p:sldId id="258" r:id="rId5"/>
+    <p:sldId id="259" r:id="rId6"/>
+    <p:sldId id="260" r:id="rId7"/>
+    <p:sldId id="261" r:id="rId8"/>
+    <p:sldId id="262" r:id="rId9"/>
   </p:sldIdLst>
   <p:sldSz cx="12192000" cy="6858000"/>
   <p:notesSz cx="6858000" cy="9144000"/>
@@ -121,9 +122,329 @@
 <file path=ppt/revisionInfo.xml><?xml version="1.0" encoding="utf-8"?>
 <p1510:revInfo xmlns:a="http://schemas.openxmlformats.org/drawingml/2006/main" xmlns:r="http://schemas.openxmlformats.org/officeDocument/2006/relationships" xmlns:p1510="http://schemas.microsoft.com/office/powerpoint/2015/10/main">
   <p1510:revLst>
+    <p1510:client id="{03C1A68B-0537-4CDC-A3E8-651D1AABDDF0}" v="11" dt="2022-12-28T05:01:42.318"/>
     <p1510:client id="{8380E109-DF06-4195-93A4-41314006A24F}" v="85" dt="2022-12-27T19:02:51.846"/>
   </p1510:revLst>
 </p1510:revInfo>
+</file>
+
+<file path=ppt/changesInfos/changesInfo1.xml><?xml version="1.0" encoding="utf-8"?>
+<pc:chgInfo xmlns:a="http://schemas.openxmlformats.org/drawingml/2006/main" xmlns:r="http://schemas.openxmlformats.org/officeDocument/2006/relationships" xmlns:ac="http://schemas.microsoft.com/office/drawing/2013/main/command" xmlns:pc="http://schemas.microsoft.com/office/powerpoint/2013/main/command">
+  <pc:docChgLst>
+    <pc:chgData name="Arindam Chattopadhyay" userId="863827462eb45c54" providerId="LiveId" clId="{03C1A68B-0537-4CDC-A3E8-651D1AABDDF0}"/>
+    <pc:docChg chg="custSel addSld delSld modSld sldOrd">
+      <pc:chgData name="Arindam Chattopadhyay" userId="863827462eb45c54" providerId="LiveId" clId="{03C1A68B-0537-4CDC-A3E8-651D1AABDDF0}" dt="2022-12-28T05:01:40.052" v="454" actId="255"/>
+      <pc:docMkLst>
+        <pc:docMk/>
+      </pc:docMkLst>
+      <pc:sldChg chg="delSp modSp mod">
+        <pc:chgData name="Arindam Chattopadhyay" userId="863827462eb45c54" providerId="LiveId" clId="{03C1A68B-0537-4CDC-A3E8-651D1AABDDF0}" dt="2022-12-28T04:59:48.792" v="414" actId="14100"/>
+        <pc:sldMkLst>
+          <pc:docMk/>
+          <pc:sldMk cId="2706294485" sldId="258"/>
+        </pc:sldMkLst>
+        <pc:spChg chg="del">
+          <ac:chgData name="Arindam Chattopadhyay" userId="863827462eb45c54" providerId="LiveId" clId="{03C1A68B-0537-4CDC-A3E8-651D1AABDDF0}" dt="2022-12-28T04:54:11.411" v="310" actId="478"/>
+          <ac:spMkLst>
+            <pc:docMk/>
+            <pc:sldMk cId="2706294485" sldId="258"/>
+            <ac:spMk id="4" creationId="{4F52DD3F-8F83-45B1-88C1-33A0C8CFF7A6}"/>
+          </ac:spMkLst>
+        </pc:spChg>
+        <pc:spChg chg="mod">
+          <ac:chgData name="Arindam Chattopadhyay" userId="863827462eb45c54" providerId="LiveId" clId="{03C1A68B-0537-4CDC-A3E8-651D1AABDDF0}" dt="2022-12-28T04:54:15.595" v="311" actId="1076"/>
+          <ac:spMkLst>
+            <pc:docMk/>
+            <pc:sldMk cId="2706294485" sldId="258"/>
+            <ac:spMk id="5" creationId="{64A8C702-C229-889B-3441-560E07E28BC3}"/>
+          </ac:spMkLst>
+        </pc:spChg>
+        <pc:spChg chg="mod">
+          <ac:chgData name="Arindam Chattopadhyay" userId="863827462eb45c54" providerId="LiveId" clId="{03C1A68B-0537-4CDC-A3E8-651D1AABDDF0}" dt="2022-12-28T04:54:17.548" v="312" actId="1076"/>
+          <ac:spMkLst>
+            <pc:docMk/>
+            <pc:sldMk cId="2706294485" sldId="258"/>
+            <ac:spMk id="6" creationId="{489CC7DE-4A5F-1FD8-AA5F-875E0AE4DF55}"/>
+          </ac:spMkLst>
+        </pc:spChg>
+        <pc:spChg chg="mod">
+          <ac:chgData name="Arindam Chattopadhyay" userId="863827462eb45c54" providerId="LiveId" clId="{03C1A68B-0537-4CDC-A3E8-651D1AABDDF0}" dt="2022-12-28T04:59:48.792" v="414" actId="14100"/>
+          <ac:spMkLst>
+            <pc:docMk/>
+            <pc:sldMk cId="2706294485" sldId="258"/>
+            <ac:spMk id="7" creationId="{99CD7454-7798-9330-6B30-749FC5C6A965}"/>
+          </ac:spMkLst>
+        </pc:spChg>
+      </pc:sldChg>
+      <pc:sldChg chg="delSp modSp mod">
+        <pc:chgData name="Arindam Chattopadhyay" userId="863827462eb45c54" providerId="LiveId" clId="{03C1A68B-0537-4CDC-A3E8-651D1AABDDF0}" dt="2022-12-28T04:55:06.199" v="320" actId="1076"/>
+        <pc:sldMkLst>
+          <pc:docMk/>
+          <pc:sldMk cId="3144717354" sldId="259"/>
+        </pc:sldMkLst>
+        <pc:spChg chg="del">
+          <ac:chgData name="Arindam Chattopadhyay" userId="863827462eb45c54" providerId="LiveId" clId="{03C1A68B-0537-4CDC-A3E8-651D1AABDDF0}" dt="2022-12-28T04:54:27.248" v="314" actId="478"/>
+          <ac:spMkLst>
+            <pc:docMk/>
+            <pc:sldMk cId="3144717354" sldId="259"/>
+            <ac:spMk id="4" creationId="{25DA130E-69AE-E37F-02F9-508CC2550E32}"/>
+          </ac:spMkLst>
+        </pc:spChg>
+        <pc:spChg chg="mod">
+          <ac:chgData name="Arindam Chattopadhyay" userId="863827462eb45c54" providerId="LiveId" clId="{03C1A68B-0537-4CDC-A3E8-651D1AABDDF0}" dt="2022-12-28T04:54:29.933" v="315" actId="1076"/>
+          <ac:spMkLst>
+            <pc:docMk/>
+            <pc:sldMk cId="3144717354" sldId="259"/>
+            <ac:spMk id="5" creationId="{956FA74A-B67F-7214-3E2C-71A263607B0D}"/>
+          </ac:spMkLst>
+        </pc:spChg>
+        <pc:spChg chg="mod">
+          <ac:chgData name="Arindam Chattopadhyay" userId="863827462eb45c54" providerId="LiveId" clId="{03C1A68B-0537-4CDC-A3E8-651D1AABDDF0}" dt="2022-12-28T04:54:31.870" v="316" actId="1076"/>
+          <ac:spMkLst>
+            <pc:docMk/>
+            <pc:sldMk cId="3144717354" sldId="259"/>
+            <ac:spMk id="6" creationId="{03266006-A4B0-790E-3CF5-9312EAFF0A33}"/>
+          </ac:spMkLst>
+        </pc:spChg>
+        <pc:spChg chg="mod">
+          <ac:chgData name="Arindam Chattopadhyay" userId="863827462eb45c54" providerId="LiveId" clId="{03C1A68B-0537-4CDC-A3E8-651D1AABDDF0}" dt="2022-12-28T04:54:56.983" v="317" actId="1076"/>
+          <ac:spMkLst>
+            <pc:docMk/>
+            <pc:sldMk cId="3144717354" sldId="259"/>
+            <ac:spMk id="7" creationId="{9EFA455A-2091-13A4-7B75-2F31D4389006}"/>
+          </ac:spMkLst>
+        </pc:spChg>
+        <pc:spChg chg="mod">
+          <ac:chgData name="Arindam Chattopadhyay" userId="863827462eb45c54" providerId="LiveId" clId="{03C1A68B-0537-4CDC-A3E8-651D1AABDDF0}" dt="2022-12-28T04:54:59.823" v="318" actId="1076"/>
+          <ac:spMkLst>
+            <pc:docMk/>
+            <pc:sldMk cId="3144717354" sldId="259"/>
+            <ac:spMk id="8" creationId="{1D352639-F721-C469-7888-E5078D8B149E}"/>
+          </ac:spMkLst>
+        </pc:spChg>
+        <pc:spChg chg="mod">
+          <ac:chgData name="Arindam Chattopadhyay" userId="863827462eb45c54" providerId="LiveId" clId="{03C1A68B-0537-4CDC-A3E8-651D1AABDDF0}" dt="2022-12-28T04:55:02.623" v="319" actId="1076"/>
+          <ac:spMkLst>
+            <pc:docMk/>
+            <pc:sldMk cId="3144717354" sldId="259"/>
+            <ac:spMk id="11" creationId="{256A95A3-159D-4A3E-499C-15BA7DE385F4}"/>
+          </ac:spMkLst>
+        </pc:spChg>
+        <pc:spChg chg="mod">
+          <ac:chgData name="Arindam Chattopadhyay" userId="863827462eb45c54" providerId="LiveId" clId="{03C1A68B-0537-4CDC-A3E8-651D1AABDDF0}" dt="2022-12-28T04:55:06.199" v="320" actId="1076"/>
+          <ac:spMkLst>
+            <pc:docMk/>
+            <pc:sldMk cId="3144717354" sldId="259"/>
+            <ac:spMk id="12" creationId="{EB01F33A-575A-D8E1-8827-9FD56C9A44A7}"/>
+          </ac:spMkLst>
+        </pc:spChg>
+      </pc:sldChg>
+      <pc:sldChg chg="delSp modSp mod">
+        <pc:chgData name="Arindam Chattopadhyay" userId="863827462eb45c54" providerId="LiveId" clId="{03C1A68B-0537-4CDC-A3E8-651D1AABDDF0}" dt="2022-12-28T05:01:40.052" v="454" actId="255"/>
+        <pc:sldMkLst>
+          <pc:docMk/>
+          <pc:sldMk cId="815354917" sldId="260"/>
+        </pc:sldMkLst>
+        <pc:spChg chg="mod">
+          <ac:chgData name="Arindam Chattopadhyay" userId="863827462eb45c54" providerId="LiveId" clId="{03C1A68B-0537-4CDC-A3E8-651D1AABDDF0}" dt="2022-12-28T05:01:40.052" v="454" actId="255"/>
+          <ac:spMkLst>
+            <pc:docMk/>
+            <pc:sldMk cId="815354917" sldId="260"/>
+            <ac:spMk id="2" creationId="{C98CA44B-45F2-D780-48A8-C06D71D13918}"/>
+          </ac:spMkLst>
+        </pc:spChg>
+        <pc:spChg chg="del">
+          <ac:chgData name="Arindam Chattopadhyay" userId="863827462eb45c54" providerId="LiveId" clId="{03C1A68B-0537-4CDC-A3E8-651D1AABDDF0}" dt="2022-12-28T04:55:11.464" v="321" actId="478"/>
+          <ac:spMkLst>
+            <pc:docMk/>
+            <pc:sldMk cId="815354917" sldId="260"/>
+            <ac:spMk id="4" creationId="{E4CD65F1-864C-6DAA-DE89-28DE3A12A07C}"/>
+          </ac:spMkLst>
+        </pc:spChg>
+        <pc:spChg chg="mod">
+          <ac:chgData name="Arindam Chattopadhyay" userId="863827462eb45c54" providerId="LiveId" clId="{03C1A68B-0537-4CDC-A3E8-651D1AABDDF0}" dt="2022-12-28T04:55:14.374" v="322" actId="1076"/>
+          <ac:spMkLst>
+            <pc:docMk/>
+            <pc:sldMk cId="815354917" sldId="260"/>
+            <ac:spMk id="5" creationId="{51F1D5CB-D6F5-A25C-1E2E-8EF9011443B5}"/>
+          </ac:spMkLst>
+        </pc:spChg>
+        <pc:spChg chg="mod">
+          <ac:chgData name="Arindam Chattopadhyay" userId="863827462eb45c54" providerId="LiveId" clId="{03C1A68B-0537-4CDC-A3E8-651D1AABDDF0}" dt="2022-12-28T04:55:17.422" v="323" actId="1076"/>
+          <ac:spMkLst>
+            <pc:docMk/>
+            <pc:sldMk cId="815354917" sldId="260"/>
+            <ac:spMk id="6" creationId="{94CF6B2D-1361-7E34-5E09-A268EE937C9D}"/>
+          </ac:spMkLst>
+        </pc:spChg>
+        <pc:spChg chg="mod">
+          <ac:chgData name="Arindam Chattopadhyay" userId="863827462eb45c54" providerId="LiveId" clId="{03C1A68B-0537-4CDC-A3E8-651D1AABDDF0}" dt="2022-12-28T04:55:20.578" v="324" actId="1076"/>
+          <ac:spMkLst>
+            <pc:docMk/>
+            <pc:sldMk cId="815354917" sldId="260"/>
+            <ac:spMk id="7" creationId="{7836D786-09E5-5038-201D-735A1A6071B1}"/>
+          </ac:spMkLst>
+        </pc:spChg>
+        <pc:spChg chg="mod">
+          <ac:chgData name="Arindam Chattopadhyay" userId="863827462eb45c54" providerId="LiveId" clId="{03C1A68B-0537-4CDC-A3E8-651D1AABDDF0}" dt="2022-12-28T04:55:23.830" v="325" actId="1076"/>
+          <ac:spMkLst>
+            <pc:docMk/>
+            <pc:sldMk cId="815354917" sldId="260"/>
+            <ac:spMk id="8" creationId="{21507469-CD4F-AA25-A718-FA025B1BFD7B}"/>
+          </ac:spMkLst>
+        </pc:spChg>
+      </pc:sldChg>
+      <pc:sldChg chg="delSp modSp mod">
+        <pc:chgData name="Arindam Chattopadhyay" userId="863827462eb45c54" providerId="LiveId" clId="{03C1A68B-0537-4CDC-A3E8-651D1AABDDF0}" dt="2022-12-28T04:55:42.975" v="331" actId="1076"/>
+        <pc:sldMkLst>
+          <pc:docMk/>
+          <pc:sldMk cId="419728732" sldId="261"/>
+        </pc:sldMkLst>
+        <pc:spChg chg="del">
+          <ac:chgData name="Arindam Chattopadhyay" userId="863827462eb45c54" providerId="LiveId" clId="{03C1A68B-0537-4CDC-A3E8-651D1AABDDF0}" dt="2022-12-28T04:55:34.903" v="328" actId="478"/>
+          <ac:spMkLst>
+            <pc:docMk/>
+            <pc:sldMk cId="419728732" sldId="261"/>
+            <ac:spMk id="2" creationId="{B38BCC31-FC29-6CC1-D49F-BBA1821E7F5D}"/>
+          </ac:spMkLst>
+        </pc:spChg>
+        <pc:spChg chg="mod">
+          <ac:chgData name="Arindam Chattopadhyay" userId="863827462eb45c54" providerId="LiveId" clId="{03C1A68B-0537-4CDC-A3E8-651D1AABDDF0}" dt="2022-12-28T04:55:37.991" v="329" actId="1076"/>
+          <ac:spMkLst>
+            <pc:docMk/>
+            <pc:sldMk cId="419728732" sldId="261"/>
+            <ac:spMk id="3" creationId="{1F8F28B6-1C66-C1C4-4441-0C343C38D5C6}"/>
+          </ac:spMkLst>
+        </pc:spChg>
+        <pc:spChg chg="mod">
+          <ac:chgData name="Arindam Chattopadhyay" userId="863827462eb45c54" providerId="LiveId" clId="{03C1A68B-0537-4CDC-A3E8-651D1AABDDF0}" dt="2022-12-28T04:55:40.494" v="330" actId="1076"/>
+          <ac:spMkLst>
+            <pc:docMk/>
+            <pc:sldMk cId="419728732" sldId="261"/>
+            <ac:spMk id="4" creationId="{C2ED5EC5-190C-4E20-BFA6-4B7C75370A0C}"/>
+          </ac:spMkLst>
+        </pc:spChg>
+        <pc:spChg chg="mod">
+          <ac:chgData name="Arindam Chattopadhyay" userId="863827462eb45c54" providerId="LiveId" clId="{03C1A68B-0537-4CDC-A3E8-651D1AABDDF0}" dt="2022-12-28T04:55:42.975" v="331" actId="1076"/>
+          <ac:spMkLst>
+            <pc:docMk/>
+            <pc:sldMk cId="419728732" sldId="261"/>
+            <ac:spMk id="5" creationId="{6E76E0B2-330B-398F-C995-137DB7510EE7}"/>
+          </ac:spMkLst>
+        </pc:spChg>
+      </pc:sldChg>
+      <pc:sldChg chg="delSp modSp mod">
+        <pc:chgData name="Arindam Chattopadhyay" userId="863827462eb45c54" providerId="LiveId" clId="{03C1A68B-0537-4CDC-A3E8-651D1AABDDF0}" dt="2022-12-28T04:55:55.255" v="335" actId="1076"/>
+        <pc:sldMkLst>
+          <pc:docMk/>
+          <pc:sldMk cId="389521371" sldId="262"/>
+        </pc:sldMkLst>
+        <pc:spChg chg="del">
+          <ac:chgData name="Arindam Chattopadhyay" userId="863827462eb45c54" providerId="LiveId" clId="{03C1A68B-0537-4CDC-A3E8-651D1AABDDF0}" dt="2022-12-28T04:55:47.023" v="332" actId="478"/>
+          <ac:spMkLst>
+            <pc:docMk/>
+            <pc:sldMk cId="389521371" sldId="262"/>
+            <ac:spMk id="4" creationId="{F3F9EC10-9FA7-7BAD-03A6-E2D13035CCBC}"/>
+          </ac:spMkLst>
+        </pc:spChg>
+        <pc:spChg chg="mod">
+          <ac:chgData name="Arindam Chattopadhyay" userId="863827462eb45c54" providerId="LiveId" clId="{03C1A68B-0537-4CDC-A3E8-651D1AABDDF0}" dt="2022-12-28T04:55:49.278" v="333" actId="1076"/>
+          <ac:spMkLst>
+            <pc:docMk/>
+            <pc:sldMk cId="389521371" sldId="262"/>
+            <ac:spMk id="5" creationId="{36185A12-0722-FDA1-088A-D216F4E7D45C}"/>
+          </ac:spMkLst>
+        </pc:spChg>
+        <pc:spChg chg="mod">
+          <ac:chgData name="Arindam Chattopadhyay" userId="863827462eb45c54" providerId="LiveId" clId="{03C1A68B-0537-4CDC-A3E8-651D1AABDDF0}" dt="2022-12-28T04:55:51.398" v="334" actId="1076"/>
+          <ac:spMkLst>
+            <pc:docMk/>
+            <pc:sldMk cId="389521371" sldId="262"/>
+            <ac:spMk id="6" creationId="{997DD09D-F8F7-8B40-6A46-D1007240C2C0}"/>
+          </ac:spMkLst>
+        </pc:spChg>
+        <pc:spChg chg="mod">
+          <ac:chgData name="Arindam Chattopadhyay" userId="863827462eb45c54" providerId="LiveId" clId="{03C1A68B-0537-4CDC-A3E8-651D1AABDDF0}" dt="2022-12-28T04:55:55.255" v="335" actId="1076"/>
+          <ac:spMkLst>
+            <pc:docMk/>
+            <pc:sldMk cId="389521371" sldId="262"/>
+            <ac:spMk id="7" creationId="{4A5EBA0F-B248-3DD1-F909-AAF5D7404ADC}"/>
+          </ac:spMkLst>
+        </pc:spChg>
+      </pc:sldChg>
+      <pc:sldChg chg="addSp delSp modSp new mod ord">
+        <pc:chgData name="Arindam Chattopadhyay" userId="863827462eb45c54" providerId="LiveId" clId="{03C1A68B-0537-4CDC-A3E8-651D1AABDDF0}" dt="2022-12-28T04:52:41.722" v="268"/>
+        <pc:sldMkLst>
+          <pc:docMk/>
+          <pc:sldMk cId="1535414651" sldId="263"/>
+        </pc:sldMkLst>
+        <pc:spChg chg="del">
+          <ac:chgData name="Arindam Chattopadhyay" userId="863827462eb45c54" providerId="LiveId" clId="{03C1A68B-0537-4CDC-A3E8-651D1AABDDF0}" dt="2022-12-28T04:50:12.125" v="5" actId="478"/>
+          <ac:spMkLst>
+            <pc:docMk/>
+            <pc:sldMk cId="1535414651" sldId="263"/>
+            <ac:spMk id="2" creationId="{3108976B-BA9C-8B30-2A9F-12C5F7551DF7}"/>
+          </ac:spMkLst>
+        </pc:spChg>
+        <pc:spChg chg="del">
+          <ac:chgData name="Arindam Chattopadhyay" userId="863827462eb45c54" providerId="LiveId" clId="{03C1A68B-0537-4CDC-A3E8-651D1AABDDF0}" dt="2022-12-28T04:50:12.125" v="5" actId="478"/>
+          <ac:spMkLst>
+            <pc:docMk/>
+            <pc:sldMk cId="1535414651" sldId="263"/>
+            <ac:spMk id="3" creationId="{DAB2D7F0-BB8E-7A27-B3BD-D26783B8502E}"/>
+          </ac:spMkLst>
+        </pc:spChg>
+        <pc:spChg chg="add del mod">
+          <ac:chgData name="Arindam Chattopadhyay" userId="863827462eb45c54" providerId="LiveId" clId="{03C1A68B-0537-4CDC-A3E8-651D1AABDDF0}" dt="2022-12-28T04:50:10.761" v="4"/>
+          <ac:spMkLst>
+            <pc:docMk/>
+            <pc:sldMk cId="1535414651" sldId="263"/>
+            <ac:spMk id="4" creationId="{393A7FF8-4EB5-203A-8D7C-7A3739E94E16}"/>
+          </ac:spMkLst>
+        </pc:spChg>
+        <pc:spChg chg="add del mod">
+          <ac:chgData name="Arindam Chattopadhyay" userId="863827462eb45c54" providerId="LiveId" clId="{03C1A68B-0537-4CDC-A3E8-651D1AABDDF0}" dt="2022-12-28T04:50:10.761" v="4"/>
+          <ac:spMkLst>
+            <pc:docMk/>
+            <pc:sldMk cId="1535414651" sldId="263"/>
+            <ac:spMk id="5" creationId="{A1878C2D-EC6B-7D95-2ED5-34AF2A07B4B8}"/>
+          </ac:spMkLst>
+        </pc:spChg>
+        <pc:spChg chg="add mod">
+          <ac:chgData name="Arindam Chattopadhyay" userId="863827462eb45c54" providerId="LiveId" clId="{03C1A68B-0537-4CDC-A3E8-651D1AABDDF0}" dt="2022-12-28T04:50:13.467" v="6"/>
+          <ac:spMkLst>
+            <pc:docMk/>
+            <pc:sldMk cId="1535414651" sldId="263"/>
+            <ac:spMk id="6" creationId="{16644990-2D0C-FD9F-C31C-139171135120}"/>
+          </ac:spMkLst>
+        </pc:spChg>
+        <pc:spChg chg="add mod">
+          <ac:chgData name="Arindam Chattopadhyay" userId="863827462eb45c54" providerId="LiveId" clId="{03C1A68B-0537-4CDC-A3E8-651D1AABDDF0}" dt="2022-12-28T04:50:20.178" v="16" actId="20577"/>
+          <ac:spMkLst>
+            <pc:docMk/>
+            <pc:sldMk cId="1535414651" sldId="263"/>
+            <ac:spMk id="7" creationId="{9F296A05-C902-92A0-7EAA-4F87D7283E9C}"/>
+          </ac:spMkLst>
+        </pc:spChg>
+        <pc:spChg chg="add mod">
+          <ac:chgData name="Arindam Chattopadhyay" userId="863827462eb45c54" providerId="LiveId" clId="{03C1A68B-0537-4CDC-A3E8-651D1AABDDF0}" dt="2022-12-28T04:52:34.561" v="266" actId="20577"/>
+          <ac:spMkLst>
+            <pc:docMk/>
+            <pc:sldMk cId="1535414651" sldId="263"/>
+            <ac:spMk id="8" creationId="{25E9C93D-AA19-C461-FAF0-141BB2BA99AF}"/>
+          </ac:spMkLst>
+        </pc:spChg>
+      </pc:sldChg>
+      <pc:sldChg chg="new del">
+        <pc:chgData name="Arindam Chattopadhyay" userId="863827462eb45c54" providerId="LiveId" clId="{03C1A68B-0537-4CDC-A3E8-651D1AABDDF0}" dt="2022-12-28T04:49:52.372" v="2" actId="2696"/>
+        <pc:sldMkLst>
+          <pc:docMk/>
+          <pc:sldMk cId="4136789043" sldId="264"/>
+        </pc:sldMkLst>
+      </pc:sldChg>
+    </pc:docChg>
+  </pc:docChgLst>
+</pc:chgInfo>
 </file>
 
 <file path=ppt/slideLayouts/slideLayout1.xml><?xml version="1.0" encoding="utf-8"?>
@@ -275,7 +596,7 @@
           <a:p>
             <a:fld id="{21ED4E78-2A0A-4B84-9F50-031AB81A0EBD}" type="datetimeFigureOut">
               <a:rPr lang="en-IN" smtClean="0"/>
-              <a:t>27-12-2022</a:t>
+              <a:t>28-12-2022</a:t>
             </a:fld>
             <a:endParaRPr lang="en-IN"/>
           </a:p>
@@ -475,7 +796,7 @@
           <a:p>
             <a:fld id="{21ED4E78-2A0A-4B84-9F50-031AB81A0EBD}" type="datetimeFigureOut">
               <a:rPr lang="en-IN" smtClean="0"/>
-              <a:t>27-12-2022</a:t>
+              <a:t>28-12-2022</a:t>
             </a:fld>
             <a:endParaRPr lang="en-IN"/>
           </a:p>
@@ -685,7 +1006,7 @@
           <a:p>
             <a:fld id="{21ED4E78-2A0A-4B84-9F50-031AB81A0EBD}" type="datetimeFigureOut">
               <a:rPr lang="en-IN" smtClean="0"/>
-              <a:t>27-12-2022</a:t>
+              <a:t>28-12-2022</a:t>
             </a:fld>
             <a:endParaRPr lang="en-IN"/>
           </a:p>
@@ -885,7 +1206,7 @@
           <a:p>
             <a:fld id="{21ED4E78-2A0A-4B84-9F50-031AB81A0EBD}" type="datetimeFigureOut">
               <a:rPr lang="en-IN" smtClean="0"/>
-              <a:t>27-12-2022</a:t>
+              <a:t>28-12-2022</a:t>
             </a:fld>
             <a:endParaRPr lang="en-IN"/>
           </a:p>
@@ -1161,7 +1482,7 @@
           <a:p>
             <a:fld id="{21ED4E78-2A0A-4B84-9F50-031AB81A0EBD}" type="datetimeFigureOut">
               <a:rPr lang="en-IN" smtClean="0"/>
-              <a:t>27-12-2022</a:t>
+              <a:t>28-12-2022</a:t>
             </a:fld>
             <a:endParaRPr lang="en-IN"/>
           </a:p>
@@ -1429,7 +1750,7 @@
           <a:p>
             <a:fld id="{21ED4E78-2A0A-4B84-9F50-031AB81A0EBD}" type="datetimeFigureOut">
               <a:rPr lang="en-IN" smtClean="0"/>
-              <a:t>27-12-2022</a:t>
+              <a:t>28-12-2022</a:t>
             </a:fld>
             <a:endParaRPr lang="en-IN"/>
           </a:p>
@@ -1844,7 +2165,7 @@
           <a:p>
             <a:fld id="{21ED4E78-2A0A-4B84-9F50-031AB81A0EBD}" type="datetimeFigureOut">
               <a:rPr lang="en-IN" smtClean="0"/>
-              <a:t>27-12-2022</a:t>
+              <a:t>28-12-2022</a:t>
             </a:fld>
             <a:endParaRPr lang="en-IN"/>
           </a:p>
@@ -1986,7 +2307,7 @@
           <a:p>
             <a:fld id="{21ED4E78-2A0A-4B84-9F50-031AB81A0EBD}" type="datetimeFigureOut">
               <a:rPr lang="en-IN" smtClean="0"/>
-              <a:t>27-12-2022</a:t>
+              <a:t>28-12-2022</a:t>
             </a:fld>
             <a:endParaRPr lang="en-IN"/>
           </a:p>
@@ -2099,7 +2420,7 @@
           <a:p>
             <a:fld id="{21ED4E78-2A0A-4B84-9F50-031AB81A0EBD}" type="datetimeFigureOut">
               <a:rPr lang="en-IN" smtClean="0"/>
-              <a:t>27-12-2022</a:t>
+              <a:t>28-12-2022</a:t>
             </a:fld>
             <a:endParaRPr lang="en-IN"/>
           </a:p>
@@ -2412,7 +2733,7 @@
           <a:p>
             <a:fld id="{21ED4E78-2A0A-4B84-9F50-031AB81A0EBD}" type="datetimeFigureOut">
               <a:rPr lang="en-IN" smtClean="0"/>
-              <a:t>27-12-2022</a:t>
+              <a:t>28-12-2022</a:t>
             </a:fld>
             <a:endParaRPr lang="en-IN"/>
           </a:p>
@@ -2701,7 +3022,7 @@
           <a:p>
             <a:fld id="{21ED4E78-2A0A-4B84-9F50-031AB81A0EBD}" type="datetimeFigureOut">
               <a:rPr lang="en-IN" smtClean="0"/>
-              <a:t>27-12-2022</a:t>
+              <a:t>28-12-2022</a:t>
             </a:fld>
             <a:endParaRPr lang="en-IN"/>
           </a:p>
@@ -2944,7 +3265,7 @@
           <a:p>
             <a:fld id="{21ED4E78-2A0A-4B84-9F50-031AB81A0EBD}" type="datetimeFigureOut">
               <a:rPr lang="en-IN" smtClean="0"/>
-              <a:t>27-12-2022</a:t>
+              <a:t>28-12-2022</a:t>
             </a:fld>
             <a:endParaRPr lang="en-IN"/>
           </a:p>
@@ -6478,10 +6799,10 @@
       </p:grpSpPr>
       <p:sp>
         <p:nvSpPr>
-          <p:cNvPr id="4" name="TextBox 3">
-            <a:extLst>
-              <a:ext uri="{FF2B5EF4-FFF2-40B4-BE49-F238E27FC236}">
-                <a16:creationId xmlns:a16="http://schemas.microsoft.com/office/drawing/2014/main" id="{4F52DD3F-8F83-45B1-88C1-33A0C8CFF7A6}"/>
+          <p:cNvPr id="6" name="TextBox 5">
+            <a:extLst>
+              <a:ext uri="{FF2B5EF4-FFF2-40B4-BE49-F238E27FC236}">
+                <a16:creationId xmlns:a16="http://schemas.microsoft.com/office/drawing/2014/main" id="{16644990-2D0C-FD9F-C31C-139171135120}"/>
               </a:ext>
             </a:extLst>
           </p:cNvPr>
@@ -6535,10 +6856,10 @@
       </p:sp>
       <p:sp>
         <p:nvSpPr>
-          <p:cNvPr id="5" name="TextBox 4">
-            <a:extLst>
-              <a:ext uri="{FF2B5EF4-FFF2-40B4-BE49-F238E27FC236}">
-                <a16:creationId xmlns:a16="http://schemas.microsoft.com/office/drawing/2014/main" id="{64A8C702-C229-889B-3441-560E07E28BC3}"/>
+          <p:cNvPr id="7" name="TextBox 6">
+            <a:extLst>
+              <a:ext uri="{FF2B5EF4-FFF2-40B4-BE49-F238E27FC236}">
+                <a16:creationId xmlns:a16="http://schemas.microsoft.com/office/drawing/2014/main" id="{9F296A05-C902-92A0-7EAA-4F87D7283E9C}"/>
               </a:ext>
             </a:extLst>
           </p:cNvPr>
@@ -6547,7 +6868,7 @@
         </p:nvSpPr>
         <p:spPr>
           <a:xfrm>
-            <a:off x="1371600" y="679747"/>
+            <a:off x="1371600" y="538163"/>
             <a:ext cx="8506691" cy="523220"/>
           </a:xfrm>
           <a:prstGeom prst="rect">
@@ -6759,10 +7080,10 @@
       </p:sp>
       <p:sp>
         <p:nvSpPr>
-          <p:cNvPr id="6" name="TextBox 5">
-            <a:extLst>
-              <a:ext uri="{FF2B5EF4-FFF2-40B4-BE49-F238E27FC236}">
-                <a16:creationId xmlns:a16="http://schemas.microsoft.com/office/drawing/2014/main" id="{489CC7DE-4A5F-1FD8-AA5F-875E0AE4DF55}"/>
+          <p:cNvPr id="8" name="TextBox 7">
+            <a:extLst>
+              <a:ext uri="{FF2B5EF4-FFF2-40B4-BE49-F238E27FC236}">
+                <a16:creationId xmlns:a16="http://schemas.microsoft.com/office/drawing/2014/main" id="{25E9C93D-AA19-C461-FAF0-141BB2BA99AF}"/>
               </a:ext>
             </a:extLst>
           </p:cNvPr>
@@ -6772,7 +7093,7 @@
         <p:spPr>
           <a:xfrm>
             <a:off x="374072" y="1374837"/>
-            <a:ext cx="11568546" cy="2862322"/>
+            <a:ext cx="11568546" cy="1754326"/>
           </a:xfrm>
           <a:prstGeom prst="rect">
             <a:avLst/>
@@ -6796,19 +7117,22 @@
                 <a:ea typeface="Fira Code" panose="020B0809050000020004" pitchFamily="49" charset="0"/>
                 <a:cs typeface="Fira Code" panose="020B0809050000020004" pitchFamily="49" charset="0"/>
               </a:rPr>
-              <a:t>Creating the Store: </a:t>
-            </a:r>
-            <a:r>
-              <a:rPr lang="en-US" dirty="0">
+              <a:t>Need to create the react app first </a:t>
+            </a:r>
+            <a:r>
+              <a:rPr lang="en-US" b="1" dirty="0">
                 <a:solidFill>
                   <a:schemeClr val="bg1"/>
                 </a:solidFill>
                 <a:latin typeface="Fira Code" panose="020B0809050000020004" pitchFamily="49" charset="0"/>
                 <a:ea typeface="Fira Code" panose="020B0809050000020004" pitchFamily="49" charset="0"/>
                 <a:cs typeface="Fira Code" panose="020B0809050000020004" pitchFamily="49" charset="0"/>
-              </a:rPr>
-              <a:t>To create the Store Redux is providing us a function called </a:t>
-            </a:r>
+                <a:sym typeface="Wingdings" panose="05000000000000000000" pitchFamily="2" charset="2"/>
+              </a:rPr>
+              <a:t></a:t>
+            </a:r>
+          </a:p>
+          <a:p>
             <a:r>
               <a:rPr lang="en-US" b="1" dirty="0">
                 <a:solidFill>
@@ -6817,111 +7141,11 @@
                 <a:latin typeface="Fira Code" panose="020B0809050000020004" pitchFamily="49" charset="0"/>
                 <a:ea typeface="Fira Code" panose="020B0809050000020004" pitchFamily="49" charset="0"/>
                 <a:cs typeface="Fira Code" panose="020B0809050000020004" pitchFamily="49" charset="0"/>
-              </a:rPr>
-              <a:t>“</a:t>
-            </a:r>
-            <a:r>
-              <a:rPr lang="en-US" b="1" i="1" u="sng" dirty="0">
-                <a:solidFill>
-                  <a:schemeClr val="bg1"/>
-                </a:solidFill>
-                <a:latin typeface="Fira Code" panose="020B0809050000020004" pitchFamily="49" charset="0"/>
-                <a:ea typeface="Fira Code" panose="020B0809050000020004" pitchFamily="49" charset="0"/>
-                <a:cs typeface="Fira Code" panose="020B0809050000020004" pitchFamily="49" charset="0"/>
-              </a:rPr>
-              <a:t>createStore</a:t>
-            </a:r>
-            <a:r>
-              <a:rPr lang="en-US" b="1" dirty="0">
-                <a:solidFill>
-                  <a:schemeClr val="bg1"/>
-                </a:solidFill>
-                <a:latin typeface="Fira Code" panose="020B0809050000020004" pitchFamily="49" charset="0"/>
-                <a:ea typeface="Fira Code" panose="020B0809050000020004" pitchFamily="49" charset="0"/>
-                <a:cs typeface="Fira Code" panose="020B0809050000020004" pitchFamily="49" charset="0"/>
-              </a:rPr>
-              <a:t>”</a:t>
-            </a:r>
-            <a:r>
-              <a:rPr lang="en-US" dirty="0">
-                <a:solidFill>
-                  <a:schemeClr val="bg1"/>
-                </a:solidFill>
-                <a:latin typeface="Fira Code" panose="020B0809050000020004" pitchFamily="49" charset="0"/>
-                <a:ea typeface="Fira Code" panose="020B0809050000020004" pitchFamily="49" charset="0"/>
-                <a:cs typeface="Fira Code" panose="020B0809050000020004" pitchFamily="49" charset="0"/>
-              </a:rPr>
-              <a:t> which we need to import first from </a:t>
-            </a:r>
-            <a:r>
-              <a:rPr lang="en-US" i="1" dirty="0">
-                <a:solidFill>
-                  <a:schemeClr val="bg1"/>
-                </a:solidFill>
-                <a:latin typeface="Fira Code" panose="020B0809050000020004" pitchFamily="49" charset="0"/>
-                <a:ea typeface="Fira Code" panose="020B0809050000020004" pitchFamily="49" charset="0"/>
-                <a:cs typeface="Fira Code" panose="020B0809050000020004" pitchFamily="49" charset="0"/>
-              </a:rPr>
-              <a:t>redux library </a:t>
-            </a:r>
-            <a:r>
-              <a:rPr lang="en-US" dirty="0">
-                <a:solidFill>
-                  <a:schemeClr val="bg1"/>
-                </a:solidFill>
-                <a:latin typeface="Fira Code" panose="020B0809050000020004" pitchFamily="49" charset="0"/>
-                <a:ea typeface="Fira Code" panose="020B0809050000020004" pitchFamily="49" charset="0"/>
-                <a:cs typeface="Fira Code" panose="020B0809050000020004" pitchFamily="49" charset="0"/>
-              </a:rPr>
-              <a:t>and then using this function we can create a store which will manage the store globally and we can provide that store using the </a:t>
-            </a:r>
-            <a:r>
-              <a:rPr lang="en-US" b="1" i="1" u="sng" dirty="0">
-                <a:solidFill>
-                  <a:schemeClr val="bg1"/>
-                </a:solidFill>
-                <a:latin typeface="Fira Code" panose="020B0809050000020004" pitchFamily="49" charset="0"/>
-                <a:ea typeface="Fira Code" panose="020B0809050000020004" pitchFamily="49" charset="0"/>
-                <a:cs typeface="Fira Code" panose="020B0809050000020004" pitchFamily="49" charset="0"/>
-              </a:rPr>
-              <a:t>Provider(</a:t>
-            </a:r>
-            <a:r>
-              <a:rPr lang="en-US" u="sng" dirty="0">
-                <a:solidFill>
-                  <a:schemeClr val="bg1"/>
-                </a:solidFill>
-                <a:latin typeface="Fira Code" panose="020B0809050000020004" pitchFamily="49" charset="0"/>
-                <a:ea typeface="Fira Code" panose="020B0809050000020004" pitchFamily="49" charset="0"/>
-                <a:cs typeface="Fira Code" panose="020B0809050000020004" pitchFamily="49" charset="0"/>
-              </a:rPr>
-              <a:t>which we again need to import from react-redux library</a:t>
-            </a:r>
-            <a:r>
-              <a:rPr lang="en-US" b="1" i="1" u="sng" dirty="0">
-                <a:solidFill>
-                  <a:schemeClr val="bg1"/>
-                </a:solidFill>
-                <a:latin typeface="Fira Code" panose="020B0809050000020004" pitchFamily="49" charset="0"/>
-                <a:ea typeface="Fira Code" panose="020B0809050000020004" pitchFamily="49" charset="0"/>
-                <a:cs typeface="Fira Code" panose="020B0809050000020004" pitchFamily="49" charset="0"/>
-              </a:rPr>
-              <a:t>)</a:t>
-            </a:r>
-            <a:r>
-              <a:rPr lang="en-US" dirty="0">
-                <a:solidFill>
-                  <a:schemeClr val="bg1"/>
-                </a:solidFill>
-                <a:latin typeface="Fira Code" panose="020B0809050000020004" pitchFamily="49" charset="0"/>
-                <a:ea typeface="Fira Code" panose="020B0809050000020004" pitchFamily="49" charset="0"/>
-                <a:cs typeface="Fira Code" panose="020B0809050000020004" pitchFamily="49" charset="0"/>
-              </a:rPr>
-              <a:t> to the ancestor component which is App in Index.js file, So that all the child component will have the access to the store so that whenever needed,  any of the child component can access the data and can change the state if needed.</a:t>
-            </a:r>
-          </a:p>
-          <a:p>
-            <a:endParaRPr lang="en-US" dirty="0">
+                <a:sym typeface="Wingdings" panose="05000000000000000000" pitchFamily="2" charset="2"/>
+              </a:rPr>
+              <a:t> npx create-react-app myapp</a:t>
+            </a:r>
+            <a:endParaRPr lang="en-US" b="1" dirty="0">
               <a:solidFill>
                 <a:schemeClr val="bg1"/>
               </a:solidFill>
@@ -6931,9 +7155,18 @@
             </a:endParaRPr>
           </a:p>
           <a:p>
-            <a:pPr algn="ctr"/>
-            <a:r>
-              <a:rPr lang="en-US" dirty="0">
+            <a:endParaRPr lang="en-US" b="1" dirty="0">
+              <a:solidFill>
+                <a:schemeClr val="bg1"/>
+              </a:solidFill>
+              <a:latin typeface="Fira Code" panose="020B0809050000020004" pitchFamily="49" charset="0"/>
+              <a:ea typeface="Fira Code" panose="020B0809050000020004" pitchFamily="49" charset="0"/>
+              <a:cs typeface="Fira Code" panose="020B0809050000020004" pitchFamily="49" charset="0"/>
+            </a:endParaRPr>
+          </a:p>
+          <a:p>
+            <a:r>
+              <a:rPr lang="en-US" b="1" dirty="0">
                 <a:solidFill>
                   <a:schemeClr val="bg1"/>
                 </a:solidFill>
@@ -6941,7 +7174,47 @@
                 <a:ea typeface="Fira Code" panose="020B0809050000020004" pitchFamily="49" charset="0"/>
                 <a:cs typeface="Fira Code" panose="020B0809050000020004" pitchFamily="49" charset="0"/>
               </a:rPr>
-              <a:t>Every Redux store has a single root reducer function, which will hold all the reducers(if we do have more than one reducers).</a:t>
+              <a:t>Then need to install redux and react redux </a:t>
+            </a:r>
+            <a:r>
+              <a:rPr lang="en-US" b="1" dirty="0">
+                <a:solidFill>
+                  <a:schemeClr val="bg1"/>
+                </a:solidFill>
+                <a:latin typeface="Fira Code" panose="020B0809050000020004" pitchFamily="49" charset="0"/>
+                <a:ea typeface="Fira Code" panose="020B0809050000020004" pitchFamily="49" charset="0"/>
+                <a:cs typeface="Fira Code" panose="020B0809050000020004" pitchFamily="49" charset="0"/>
+                <a:sym typeface="Wingdings" panose="05000000000000000000" pitchFamily="2" charset="2"/>
+              </a:rPr>
+              <a:t> </a:t>
+            </a:r>
+          </a:p>
+          <a:p>
+            <a:r>
+              <a:rPr lang="en-US" b="1" dirty="0">
+                <a:solidFill>
+                  <a:schemeClr val="bg1"/>
+                </a:solidFill>
+                <a:latin typeface="Fira Code" panose="020B0809050000020004" pitchFamily="49" charset="0"/>
+                <a:ea typeface="Fira Code" panose="020B0809050000020004" pitchFamily="49" charset="0"/>
+                <a:cs typeface="Fira Code" panose="020B0809050000020004" pitchFamily="49" charset="0"/>
+                <a:sym typeface="Wingdings" panose="05000000000000000000" pitchFamily="2" charset="2"/>
+              </a:rPr>
+              <a:t> npm install redux</a:t>
+            </a:r>
+          </a:p>
+          <a:p>
+            <a:r>
+              <a:rPr lang="en-US" b="1" dirty="0">
+                <a:solidFill>
+                  <a:schemeClr val="bg1"/>
+                </a:solidFill>
+                <a:latin typeface="Fira Code" panose="020B0809050000020004" pitchFamily="49" charset="0"/>
+                <a:ea typeface="Fira Code" panose="020B0809050000020004" pitchFamily="49" charset="0"/>
+                <a:cs typeface="Fira Code" panose="020B0809050000020004" pitchFamily="49" charset="0"/>
+                <a:sym typeface="Wingdings" panose="05000000000000000000" pitchFamily="2" charset="2"/>
+              </a:rPr>
+              <a:t> npm install react-redux </a:t>
             </a:r>
             <a:endParaRPr lang="en-IN" dirty="0">
               <a:solidFill>
@@ -6954,66 +7227,10 @@
           </a:p>
         </p:txBody>
       </p:sp>
-      <p:sp>
-        <p:nvSpPr>
-          <p:cNvPr id="7" name="TextBox 6">
-            <a:extLst>
-              <a:ext uri="{FF2B5EF4-FFF2-40B4-BE49-F238E27FC236}">
-                <a16:creationId xmlns:a16="http://schemas.microsoft.com/office/drawing/2014/main" id="{99CD7454-7798-9330-6B30-749FC5C6A965}"/>
-              </a:ext>
-            </a:extLst>
-          </p:cNvPr>
-          <p:cNvSpPr txBox="1"/>
-          <p:nvPr/>
-        </p:nvSpPr>
-        <p:spPr>
-          <a:xfrm>
-            <a:off x="374072" y="4827120"/>
-            <a:ext cx="11180618" cy="954107"/>
-          </a:xfrm>
-          <a:prstGeom prst="rect">
-            <a:avLst/>
-          </a:prstGeom>
-          <a:solidFill>
-            <a:srgbClr val="92D050"/>
-          </a:solidFill>
-        </p:spPr>
-        <p:txBody>
-          <a:bodyPr wrap="square" rtlCol="0">
-            <a:spAutoFit/>
-          </a:bodyPr>
-          <a:lstStyle/>
-          <a:p>
-            <a:r>
-              <a:rPr lang="en-US" sz="2800" b="1" dirty="0">
-                <a:latin typeface="Fira Code" panose="020B0809050000020004" pitchFamily="49" charset="0"/>
-                <a:ea typeface="Fira Code" panose="020B0809050000020004" pitchFamily="49" charset="0"/>
-                <a:cs typeface="Fira Code" panose="020B0809050000020004" pitchFamily="49" charset="0"/>
-              </a:rPr>
-              <a:t>Import { createStore } from”reudx”;</a:t>
-            </a:r>
-          </a:p>
-          <a:p>
-            <a:r>
-              <a:rPr lang="en-US" sz="2800" b="1" dirty="0">
-                <a:latin typeface="Fira Code" panose="020B0809050000020004" pitchFamily="49" charset="0"/>
-                <a:ea typeface="Fira Code" panose="020B0809050000020004" pitchFamily="49" charset="0"/>
-                <a:cs typeface="Fira Code" panose="020B0809050000020004" pitchFamily="49" charset="0"/>
-              </a:rPr>
-              <a:t>Const store = createStore ( rootReducers )</a:t>
-            </a:r>
-            <a:endParaRPr lang="en-IN" sz="2800" b="1" dirty="0">
-              <a:latin typeface="Fira Code" panose="020B0809050000020004" pitchFamily="49" charset="0"/>
-              <a:ea typeface="Fira Code" panose="020B0809050000020004" pitchFamily="49" charset="0"/>
-              <a:cs typeface="Fira Code" panose="020B0809050000020004" pitchFamily="49" charset="0"/>
-            </a:endParaRPr>
-          </a:p>
-        </p:txBody>
-      </p:sp>
     </p:spTree>
     <p:extLst>
       <p:ext uri="{BB962C8B-B14F-4D97-AF65-F5344CB8AC3E}">
-        <p14:creationId xmlns:p14="http://schemas.microsoft.com/office/powerpoint/2010/main" val="2706294485"/>
+        <p14:creationId xmlns:p14="http://schemas.microsoft.com/office/powerpoint/2010/main" val="1535414651"/>
       </p:ext>
     </p:extLst>
   </p:cSld>
@@ -7042,10 +7259,10 @@
       </p:grpSpPr>
       <p:sp>
         <p:nvSpPr>
-          <p:cNvPr id="4" name="TextBox 3">
-            <a:extLst>
-              <a:ext uri="{FF2B5EF4-FFF2-40B4-BE49-F238E27FC236}">
-                <a16:creationId xmlns:a16="http://schemas.microsoft.com/office/drawing/2014/main" id="{25DA130E-69AE-E37F-02F9-508CC2550E32}"/>
+          <p:cNvPr id="5" name="TextBox 4">
+            <a:extLst>
+              <a:ext uri="{FF2B5EF4-FFF2-40B4-BE49-F238E27FC236}">
+                <a16:creationId xmlns:a16="http://schemas.microsoft.com/office/drawing/2014/main" id="{64A8C702-C229-889B-3441-560E07E28BC3}"/>
               </a:ext>
             </a:extLst>
           </p:cNvPr>
@@ -7054,64 +7271,7 @@
         </p:nvSpPr>
         <p:spPr>
           <a:xfrm>
-            <a:off x="249381" y="138545"/>
-            <a:ext cx="11693237" cy="369332"/>
-          </a:xfrm>
-          <a:prstGeom prst="rect">
-            <a:avLst/>
-          </a:prstGeom>
-          <a:noFill/>
-        </p:spPr>
-        <p:txBody>
-          <a:bodyPr wrap="square" rtlCol="0">
-            <a:spAutoFit/>
-          </a:bodyPr>
-          <a:lstStyle/>
-          <a:p>
-            <a:pPr algn="ctr"/>
-            <a:r>
-              <a:rPr lang="en-US" dirty="0">
-                <a:solidFill>
-                  <a:srgbClr val="FF0000"/>
-                </a:solidFill>
-                <a:highlight>
-                  <a:srgbClr val="FFFF00"/>
-                </a:highlight>
-                <a:latin typeface="Fira Code" panose="020B0809050000020004" pitchFamily="49" charset="0"/>
-                <a:ea typeface="Fira Code" panose="020B0809050000020004" pitchFamily="49" charset="0"/>
-                <a:cs typeface="Fira Code" panose="020B0809050000020004" pitchFamily="49" charset="0"/>
-              </a:rPr>
-              <a:t>Let’s now explore the steps of using Redux with React to manage the state Globally.</a:t>
-            </a:r>
-            <a:endParaRPr lang="en-IN" dirty="0">
-              <a:solidFill>
-                <a:srgbClr val="FF0000"/>
-              </a:solidFill>
-              <a:highlight>
-                <a:srgbClr val="FFFF00"/>
-              </a:highlight>
-              <a:latin typeface="Fira Code" panose="020B0809050000020004" pitchFamily="49" charset="0"/>
-              <a:ea typeface="Fira Code" panose="020B0809050000020004" pitchFamily="49" charset="0"/>
-              <a:cs typeface="Fira Code" panose="020B0809050000020004" pitchFamily="49" charset="0"/>
-            </a:endParaRPr>
-          </a:p>
-        </p:txBody>
-      </p:sp>
-      <p:sp>
-        <p:nvSpPr>
-          <p:cNvPr id="5" name="TextBox 4">
-            <a:extLst>
-              <a:ext uri="{FF2B5EF4-FFF2-40B4-BE49-F238E27FC236}">
-                <a16:creationId xmlns:a16="http://schemas.microsoft.com/office/drawing/2014/main" id="{956FA74A-B67F-7214-3E2C-71A263607B0D}"/>
-              </a:ext>
-            </a:extLst>
-          </p:cNvPr>
-          <p:cNvSpPr txBox="1"/>
-          <p:nvPr/>
-        </p:nvSpPr>
-        <p:spPr>
-          <a:xfrm>
-            <a:off x="1371600" y="679747"/>
+            <a:off x="1246909" y="261656"/>
             <a:ext cx="8506691" cy="523220"/>
           </a:xfrm>
           <a:prstGeom prst="rect">
@@ -7326,7 +7486,7 @@
           <p:cNvPr id="6" name="TextBox 5">
             <a:extLst>
               <a:ext uri="{FF2B5EF4-FFF2-40B4-BE49-F238E27FC236}">
-                <a16:creationId xmlns:a16="http://schemas.microsoft.com/office/drawing/2014/main" id="{03266006-A4B0-790E-3CF5-9312EAFF0A33}"/>
+                <a16:creationId xmlns:a16="http://schemas.microsoft.com/office/drawing/2014/main" id="{489CC7DE-4A5F-1FD8-AA5F-875E0AE4DF55}"/>
               </a:ext>
             </a:extLst>
           </p:cNvPr>
@@ -7335,8 +7495,8 @@
         </p:nvSpPr>
         <p:spPr>
           <a:xfrm>
-            <a:off x="374072" y="1374837"/>
-            <a:ext cx="11568546" cy="1200329"/>
+            <a:off x="311727" y="1066155"/>
+            <a:ext cx="11568546" cy="2862322"/>
           </a:xfrm>
           <a:prstGeom prst="rect">
             <a:avLst/>
@@ -7360,7 +7520,7 @@
                 <a:ea typeface="Fira Code" panose="020B0809050000020004" pitchFamily="49" charset="0"/>
                 <a:cs typeface="Fira Code" panose="020B0809050000020004" pitchFamily="49" charset="0"/>
               </a:rPr>
-              <a:t>Creating the Action with the Action Creator: </a:t>
+              <a:t>Creating the Store: </a:t>
             </a:r>
             <a:r>
               <a:rPr lang="en-US" dirty="0">
@@ -7371,19 +7531,18 @@
                 <a:ea typeface="Fira Code" panose="020B0809050000020004" pitchFamily="49" charset="0"/>
                 <a:cs typeface="Fira Code" panose="020B0809050000020004" pitchFamily="49" charset="0"/>
               </a:rPr>
-              <a:t>Actions are plain JavaScript objects which have two properties </a:t>
-            </a:r>
-            <a:r>
-              <a:rPr lang="en-US" dirty="0">
+              <a:t>To create the Store Redux is providing us a function called </a:t>
+            </a:r>
+            <a:r>
+              <a:rPr lang="en-US" b="1" dirty="0">
                 <a:solidFill>
                   <a:schemeClr val="bg1"/>
                 </a:solidFill>
                 <a:latin typeface="Fira Code" panose="020B0809050000020004" pitchFamily="49" charset="0"/>
                 <a:ea typeface="Fira Code" panose="020B0809050000020004" pitchFamily="49" charset="0"/>
                 <a:cs typeface="Fira Code" panose="020B0809050000020004" pitchFamily="49" charset="0"/>
-                <a:sym typeface="Wingdings" panose="05000000000000000000" pitchFamily="2" charset="2"/>
-              </a:rPr>
-              <a:t> </a:t>
+              </a:rPr>
+              <a:t>“</a:t>
             </a:r>
             <a:r>
               <a:rPr lang="en-US" b="1" i="1" u="sng" dirty="0">
@@ -7393,45 +7552,41 @@
                 <a:latin typeface="Fira Code" panose="020B0809050000020004" pitchFamily="49" charset="0"/>
                 <a:ea typeface="Fira Code" panose="020B0809050000020004" pitchFamily="49" charset="0"/>
                 <a:cs typeface="Fira Code" panose="020B0809050000020004" pitchFamily="49" charset="0"/>
-                <a:sym typeface="Wingdings" panose="05000000000000000000" pitchFamily="2" charset="2"/>
-              </a:rPr>
-              <a:t>type and payload</a:t>
-            </a:r>
-            <a:r>
-              <a:rPr lang="en-US" dirty="0">
+              </a:rPr>
+              <a:t>createStore</a:t>
+            </a:r>
+            <a:r>
+              <a:rPr lang="en-US" b="1" dirty="0">
                 <a:solidFill>
                   <a:schemeClr val="bg1"/>
                 </a:solidFill>
                 <a:latin typeface="Fira Code" panose="020B0809050000020004" pitchFamily="49" charset="0"/>
                 <a:ea typeface="Fira Code" panose="020B0809050000020004" pitchFamily="49" charset="0"/>
                 <a:cs typeface="Fira Code" panose="020B0809050000020004" pitchFamily="49" charset="0"/>
-                <a:sym typeface="Wingdings" panose="05000000000000000000" pitchFamily="2" charset="2"/>
-              </a:rPr>
-              <a:t> (</a:t>
-            </a:r>
-            <a:r>
-              <a:rPr lang="en-US" b="1" u="sng" dirty="0">
+              </a:rPr>
+              <a:t>”</a:t>
+            </a:r>
+            <a:r>
+              <a:rPr lang="en-US" dirty="0">
                 <a:solidFill>
                   <a:schemeClr val="bg1"/>
                 </a:solidFill>
                 <a:latin typeface="Fira Code" panose="020B0809050000020004" pitchFamily="49" charset="0"/>
                 <a:ea typeface="Fira Code" panose="020B0809050000020004" pitchFamily="49" charset="0"/>
                 <a:cs typeface="Fira Code" panose="020B0809050000020004" pitchFamily="49" charset="0"/>
-                <a:sym typeface="Wingdings" panose="05000000000000000000" pitchFamily="2" charset="2"/>
-              </a:rPr>
-              <a:t>type is like unique action type and payload is the data that if we want to pass to the store then we can put it inside the payload</a:t>
-            </a:r>
-            <a:r>
-              <a:rPr lang="en-US" dirty="0">
+              </a:rPr>
+              <a:t> which we need to import first from </a:t>
+            </a:r>
+            <a:r>
+              <a:rPr lang="en-US" i="1" dirty="0">
                 <a:solidFill>
                   <a:schemeClr val="bg1"/>
                 </a:solidFill>
                 <a:latin typeface="Fira Code" panose="020B0809050000020004" pitchFamily="49" charset="0"/>
                 <a:ea typeface="Fira Code" panose="020B0809050000020004" pitchFamily="49" charset="0"/>
                 <a:cs typeface="Fira Code" panose="020B0809050000020004" pitchFamily="49" charset="0"/>
-                <a:sym typeface="Wingdings" panose="05000000000000000000" pitchFamily="2" charset="2"/>
-              </a:rPr>
-              <a:t>)</a:t>
+              </a:rPr>
+              <a:t>redux library </a:t>
             </a:r>
             <a:r>
               <a:rPr lang="en-US" dirty="0">
@@ -7442,7 +7597,75 @@
                 <a:ea typeface="Fira Code" panose="020B0809050000020004" pitchFamily="49" charset="0"/>
                 <a:cs typeface="Fira Code" panose="020B0809050000020004" pitchFamily="49" charset="0"/>
               </a:rPr>
-              <a:t>. Actions only can tell what to do but not how to do it.</a:t>
+              <a:t>and then using this function we can create a store which will manage the store globally and we can provide that store using the </a:t>
+            </a:r>
+            <a:r>
+              <a:rPr lang="en-US" b="1" i="1" u="sng" dirty="0">
+                <a:solidFill>
+                  <a:schemeClr val="bg1"/>
+                </a:solidFill>
+                <a:latin typeface="Fira Code" panose="020B0809050000020004" pitchFamily="49" charset="0"/>
+                <a:ea typeface="Fira Code" panose="020B0809050000020004" pitchFamily="49" charset="0"/>
+                <a:cs typeface="Fira Code" panose="020B0809050000020004" pitchFamily="49" charset="0"/>
+              </a:rPr>
+              <a:t>Provider(</a:t>
+            </a:r>
+            <a:r>
+              <a:rPr lang="en-US" u="sng" dirty="0">
+                <a:solidFill>
+                  <a:schemeClr val="bg1"/>
+                </a:solidFill>
+                <a:latin typeface="Fira Code" panose="020B0809050000020004" pitchFamily="49" charset="0"/>
+                <a:ea typeface="Fira Code" panose="020B0809050000020004" pitchFamily="49" charset="0"/>
+                <a:cs typeface="Fira Code" panose="020B0809050000020004" pitchFamily="49" charset="0"/>
+              </a:rPr>
+              <a:t>which we again need to import from react-redux library</a:t>
+            </a:r>
+            <a:r>
+              <a:rPr lang="en-US" b="1" i="1" u="sng" dirty="0">
+                <a:solidFill>
+                  <a:schemeClr val="bg1"/>
+                </a:solidFill>
+                <a:latin typeface="Fira Code" panose="020B0809050000020004" pitchFamily="49" charset="0"/>
+                <a:ea typeface="Fira Code" panose="020B0809050000020004" pitchFamily="49" charset="0"/>
+                <a:cs typeface="Fira Code" panose="020B0809050000020004" pitchFamily="49" charset="0"/>
+              </a:rPr>
+              <a:t>)</a:t>
+            </a:r>
+            <a:r>
+              <a:rPr lang="en-US" dirty="0">
+                <a:solidFill>
+                  <a:schemeClr val="bg1"/>
+                </a:solidFill>
+                <a:latin typeface="Fira Code" panose="020B0809050000020004" pitchFamily="49" charset="0"/>
+                <a:ea typeface="Fira Code" panose="020B0809050000020004" pitchFamily="49" charset="0"/>
+                <a:cs typeface="Fira Code" panose="020B0809050000020004" pitchFamily="49" charset="0"/>
+              </a:rPr>
+              <a:t> to the ancestor component which is App in Index.js file, So that all the child component will have the access to the store so that whenever needed,  any of the child component can access the data and can change the state if needed.</a:t>
+            </a:r>
+          </a:p>
+          <a:p>
+            <a:endParaRPr lang="en-US" dirty="0">
+              <a:solidFill>
+                <a:schemeClr val="bg1"/>
+              </a:solidFill>
+              <a:latin typeface="Fira Code" panose="020B0809050000020004" pitchFamily="49" charset="0"/>
+              <a:ea typeface="Fira Code" panose="020B0809050000020004" pitchFamily="49" charset="0"/>
+              <a:cs typeface="Fira Code" panose="020B0809050000020004" pitchFamily="49" charset="0"/>
+            </a:endParaRPr>
+          </a:p>
+          <a:p>
+            <a:pPr algn="ctr"/>
+            <a:r>
+              <a:rPr lang="en-US" dirty="0">
+                <a:solidFill>
+                  <a:schemeClr val="bg1"/>
+                </a:solidFill>
+                <a:latin typeface="Fira Code" panose="020B0809050000020004" pitchFamily="49" charset="0"/>
+                <a:ea typeface="Fira Code" panose="020B0809050000020004" pitchFamily="49" charset="0"/>
+                <a:cs typeface="Fira Code" panose="020B0809050000020004" pitchFamily="49" charset="0"/>
+              </a:rPr>
+              <a:t>Every Redux store has a single root reducer function, which will hold all the reducers(if we do have more than one reducers).</a:t>
             </a:r>
             <a:endParaRPr lang="en-IN" dirty="0">
               <a:solidFill>
@@ -7460,7 +7683,7 @@
           <p:cNvPr id="7" name="TextBox 6">
             <a:extLst>
               <a:ext uri="{FF2B5EF4-FFF2-40B4-BE49-F238E27FC236}">
-                <a16:creationId xmlns:a16="http://schemas.microsoft.com/office/drawing/2014/main" id="{9EFA455A-2091-13A4-7B75-2F31D4389006}"/>
+                <a16:creationId xmlns:a16="http://schemas.microsoft.com/office/drawing/2014/main" id="{99CD7454-7798-9330-6B30-749FC5C6A965}"/>
               </a:ext>
             </a:extLst>
           </p:cNvPr>
@@ -7469,229 +7692,8 @@
         </p:nvSpPr>
         <p:spPr>
           <a:xfrm>
-            <a:off x="374072" y="2841961"/>
-            <a:ext cx="11568546" cy="1200329"/>
-          </a:xfrm>
-          <a:prstGeom prst="rect">
-            <a:avLst/>
-          </a:prstGeom>
-          <a:solidFill>
-            <a:srgbClr val="0070C0"/>
-          </a:solidFill>
-        </p:spPr>
-        <p:txBody>
-          <a:bodyPr wrap="square" rtlCol="0">
-            <a:spAutoFit/>
-          </a:bodyPr>
-          <a:lstStyle/>
-          <a:p>
-            <a:pPr algn="ctr"/>
-            <a:r>
-              <a:rPr lang="en-US" b="1" dirty="0">
-                <a:solidFill>
-                  <a:schemeClr val="bg1"/>
-                </a:solidFill>
-                <a:latin typeface="Fira Code" panose="020B0809050000020004" pitchFamily="49" charset="0"/>
-                <a:ea typeface="Fira Code" panose="020B0809050000020004" pitchFamily="49" charset="0"/>
-                <a:cs typeface="Fira Code" panose="020B0809050000020004" pitchFamily="49" charset="0"/>
-              </a:rPr>
-              <a:t>return {</a:t>
-            </a:r>
-          </a:p>
-          <a:p>
-            <a:pPr algn="ctr"/>
-            <a:r>
-              <a:rPr lang="en-US" b="1" dirty="0">
-                <a:solidFill>
-                  <a:schemeClr val="bg1"/>
-                </a:solidFill>
-                <a:latin typeface="Fira Code" panose="020B0809050000020004" pitchFamily="49" charset="0"/>
-                <a:ea typeface="Fira Code" panose="020B0809050000020004" pitchFamily="49" charset="0"/>
-                <a:cs typeface="Fira Code" panose="020B0809050000020004" pitchFamily="49" charset="0"/>
-              </a:rPr>
-              <a:t>		     type: “Increment”,</a:t>
-            </a:r>
-          </a:p>
-          <a:p>
-            <a:pPr algn="ctr"/>
-            <a:r>
-              <a:rPr lang="en-US" b="1" dirty="0">
-                <a:solidFill>
-                  <a:schemeClr val="bg1"/>
-                </a:solidFill>
-                <a:latin typeface="Fira Code" panose="020B0809050000020004" pitchFamily="49" charset="0"/>
-                <a:ea typeface="Fira Code" panose="020B0809050000020004" pitchFamily="49" charset="0"/>
-                <a:cs typeface="Fira Code" panose="020B0809050000020004" pitchFamily="49" charset="0"/>
-              </a:rPr>
-              <a:t>		payload: num</a:t>
-            </a:r>
-          </a:p>
-          <a:p>
-            <a:pPr algn="ctr"/>
-            <a:r>
-              <a:rPr lang="en-US" b="1" dirty="0">
-                <a:solidFill>
-                  <a:schemeClr val="bg1"/>
-                </a:solidFill>
-                <a:latin typeface="Fira Code" panose="020B0809050000020004" pitchFamily="49" charset="0"/>
-                <a:ea typeface="Fira Code" panose="020B0809050000020004" pitchFamily="49" charset="0"/>
-                <a:cs typeface="Fira Code" panose="020B0809050000020004" pitchFamily="49" charset="0"/>
-              </a:rPr>
-              <a:t>}</a:t>
-            </a:r>
-            <a:endParaRPr lang="en-IN" dirty="0">
-              <a:solidFill>
-                <a:schemeClr val="bg1"/>
-              </a:solidFill>
-              <a:latin typeface="Fira Code" panose="020B0809050000020004" pitchFamily="49" charset="0"/>
-              <a:ea typeface="Fira Code" panose="020B0809050000020004" pitchFamily="49" charset="0"/>
-              <a:cs typeface="Fira Code" panose="020B0809050000020004" pitchFamily="49" charset="0"/>
-            </a:endParaRPr>
-          </a:p>
-        </p:txBody>
-      </p:sp>
-      <p:sp>
-        <p:nvSpPr>
-          <p:cNvPr id="8" name="TextBox 7">
-            <a:extLst>
-              <a:ext uri="{FF2B5EF4-FFF2-40B4-BE49-F238E27FC236}">
-                <a16:creationId xmlns:a16="http://schemas.microsoft.com/office/drawing/2014/main" id="{1D352639-F721-C469-7888-E5078D8B149E}"/>
-              </a:ext>
-            </a:extLst>
-          </p:cNvPr>
-          <p:cNvSpPr txBox="1"/>
-          <p:nvPr/>
-        </p:nvSpPr>
-        <p:spPr>
-          <a:xfrm>
-            <a:off x="706582" y="3297384"/>
-            <a:ext cx="3117273" cy="369332"/>
-          </a:xfrm>
-          <a:prstGeom prst="rect">
-            <a:avLst/>
-          </a:prstGeom>
-          <a:noFill/>
-        </p:spPr>
-        <p:txBody>
-          <a:bodyPr wrap="square" rtlCol="0">
-            <a:spAutoFit/>
-          </a:bodyPr>
-          <a:lstStyle/>
-          <a:p>
-            <a:pPr algn="ctr"/>
-            <a:r>
-              <a:rPr lang="en-US" b="1" dirty="0">
-                <a:solidFill>
-                  <a:schemeClr val="bg1"/>
-                </a:solidFill>
-                <a:latin typeface="Fira Code" panose="020B0809050000020004" pitchFamily="49" charset="0"/>
-                <a:ea typeface="Fira Code" panose="020B0809050000020004" pitchFamily="49" charset="0"/>
-                <a:cs typeface="Fira Code" panose="020B0809050000020004" pitchFamily="49" charset="0"/>
-              </a:rPr>
-              <a:t>This is Action </a:t>
-            </a:r>
-            <a:r>
-              <a:rPr lang="en-US" b="1" dirty="0">
-                <a:solidFill>
-                  <a:schemeClr val="bg1"/>
-                </a:solidFill>
-                <a:latin typeface="Fira Code" panose="020B0809050000020004" pitchFamily="49" charset="0"/>
-                <a:ea typeface="Fira Code" panose="020B0809050000020004" pitchFamily="49" charset="0"/>
-                <a:cs typeface="Fira Code" panose="020B0809050000020004" pitchFamily="49" charset="0"/>
-                <a:sym typeface="Wingdings" panose="05000000000000000000" pitchFamily="2" charset="2"/>
-              </a:rPr>
-              <a:t></a:t>
-            </a:r>
-            <a:endParaRPr lang="en-IN" b="1" dirty="0">
-              <a:solidFill>
-                <a:schemeClr val="bg1"/>
-              </a:solidFill>
-              <a:latin typeface="Fira Code" panose="020B0809050000020004" pitchFamily="49" charset="0"/>
-              <a:ea typeface="Fira Code" panose="020B0809050000020004" pitchFamily="49" charset="0"/>
-              <a:cs typeface="Fira Code" panose="020B0809050000020004" pitchFamily="49" charset="0"/>
-            </a:endParaRPr>
-          </a:p>
-        </p:txBody>
-      </p:sp>
-      <p:sp>
-        <p:nvSpPr>
-          <p:cNvPr id="10" name="TextBox 9">
-            <a:extLst>
-              <a:ext uri="{FF2B5EF4-FFF2-40B4-BE49-F238E27FC236}">
-                <a16:creationId xmlns:a16="http://schemas.microsoft.com/office/drawing/2014/main" id="{CA7B242E-6D17-1A68-2F3B-2E24E0A19A60}"/>
-              </a:ext>
-            </a:extLst>
-          </p:cNvPr>
-          <p:cNvSpPr txBox="1"/>
-          <p:nvPr/>
-        </p:nvSpPr>
-        <p:spPr>
-          <a:xfrm>
-            <a:off x="394854" y="4740217"/>
-            <a:ext cx="4107873" cy="369332"/>
-          </a:xfrm>
-          <a:prstGeom prst="rect">
-            <a:avLst/>
-          </a:prstGeom>
-          <a:noFill/>
-        </p:spPr>
-        <p:txBody>
-          <a:bodyPr wrap="square" rtlCol="0">
-            <a:spAutoFit/>
-          </a:bodyPr>
-          <a:lstStyle/>
-          <a:p>
-            <a:pPr algn="ctr"/>
-            <a:r>
-              <a:rPr lang="en-US" b="1" dirty="0">
-                <a:solidFill>
-                  <a:schemeClr val="bg1"/>
-                </a:solidFill>
-                <a:latin typeface="Fira Code" panose="020B0809050000020004" pitchFamily="49" charset="0"/>
-                <a:ea typeface="Fira Code" panose="020B0809050000020004" pitchFamily="49" charset="0"/>
-                <a:cs typeface="Fira Code" panose="020B0809050000020004" pitchFamily="49" charset="0"/>
-              </a:rPr>
-              <a:t>This is Action Creator </a:t>
-            </a:r>
-            <a:r>
-              <a:rPr lang="en-US" b="1" dirty="0">
-                <a:solidFill>
-                  <a:schemeClr val="bg1"/>
-                </a:solidFill>
-                <a:latin typeface="Fira Code" panose="020B0809050000020004" pitchFamily="49" charset="0"/>
-                <a:ea typeface="Fira Code" panose="020B0809050000020004" pitchFamily="49" charset="0"/>
-                <a:cs typeface="Fira Code" panose="020B0809050000020004" pitchFamily="49" charset="0"/>
-                <a:sym typeface="Wingdings" panose="05000000000000000000" pitchFamily="2" charset="2"/>
-              </a:rPr>
-              <a:t></a:t>
-            </a:r>
-            <a:endParaRPr lang="en-IN" b="1" dirty="0">
-              <a:solidFill>
-                <a:schemeClr val="bg1"/>
-              </a:solidFill>
-              <a:latin typeface="Fira Code" panose="020B0809050000020004" pitchFamily="49" charset="0"/>
-              <a:ea typeface="Fira Code" panose="020B0809050000020004" pitchFamily="49" charset="0"/>
-              <a:cs typeface="Fira Code" panose="020B0809050000020004" pitchFamily="49" charset="0"/>
-            </a:endParaRPr>
-          </a:p>
-        </p:txBody>
-      </p:sp>
-      <p:sp>
-        <p:nvSpPr>
-          <p:cNvPr id="11" name="TextBox 10">
-            <a:extLst>
-              <a:ext uri="{FF2B5EF4-FFF2-40B4-BE49-F238E27FC236}">
-                <a16:creationId xmlns:a16="http://schemas.microsoft.com/office/drawing/2014/main" id="{256A95A3-159D-4A3E-499C-15BA7DE385F4}"/>
-              </a:ext>
-            </a:extLst>
-          </p:cNvPr>
-          <p:cNvSpPr txBox="1"/>
-          <p:nvPr/>
-        </p:nvSpPr>
-        <p:spPr>
-          <a:xfrm>
-            <a:off x="706582" y="4613564"/>
-            <a:ext cx="11236036" cy="1754326"/>
+            <a:off x="166255" y="4494611"/>
+            <a:ext cx="11845636" cy="1815882"/>
           </a:xfrm>
           <a:prstGeom prst="rect">
             <a:avLst/>
@@ -7706,71 +7708,35 @@
           </a:bodyPr>
           <a:lstStyle/>
           <a:p>
-            <a:pPr algn="ctr"/>
-            <a:r>
-              <a:rPr lang="en-US" b="1" dirty="0">
+            <a:r>
+              <a:rPr lang="en-US" sz="2800" b="1" dirty="0">
                 <a:latin typeface="Fira Code" panose="020B0809050000020004" pitchFamily="49" charset="0"/>
                 <a:ea typeface="Fira Code" panose="020B0809050000020004" pitchFamily="49" charset="0"/>
                 <a:cs typeface="Fira Code" panose="020B0809050000020004" pitchFamily="49" charset="0"/>
               </a:rPr>
-              <a:t>export const incNumberBy = (num) =&gt;{</a:t>
-            </a:r>
-          </a:p>
-          <a:p>
-            <a:pPr algn="ctr"/>
-            <a:r>
-              <a:rPr lang="en-US" b="1" dirty="0">
+              <a:t> import { createStore } from”reudx”;</a:t>
+            </a:r>
+          </a:p>
+          <a:p>
+            <a:r>
+              <a:rPr lang="en-US" sz="2800" b="1" dirty="0">
                 <a:latin typeface="Fira Code" panose="020B0809050000020004" pitchFamily="49" charset="0"/>
                 <a:ea typeface="Fira Code" panose="020B0809050000020004" pitchFamily="49" charset="0"/>
                 <a:cs typeface="Fira Code" panose="020B0809050000020004" pitchFamily="49" charset="0"/>
               </a:rPr>
-              <a:t>	return {</a:t>
-            </a:r>
-          </a:p>
-          <a:p>
-            <a:pPr algn="ctr"/>
-            <a:r>
-              <a:rPr lang="en-US" b="1" dirty="0">
+              <a:t> import rootReducers from “path of the rootreducer.jsx file”</a:t>
+            </a:r>
+          </a:p>
+          <a:p>
+            <a:r>
+              <a:rPr lang="en-US" sz="2800" b="1" dirty="0">
                 <a:latin typeface="Fira Code" panose="020B0809050000020004" pitchFamily="49" charset="0"/>
                 <a:ea typeface="Fira Code" panose="020B0809050000020004" pitchFamily="49" charset="0"/>
                 <a:cs typeface="Fira Code" panose="020B0809050000020004" pitchFamily="49" charset="0"/>
               </a:rPr>
-              <a:t>	     type: “INCREMENT”,</a:t>
-            </a:r>
-          </a:p>
-          <a:p>
-            <a:pPr algn="ctr"/>
-            <a:r>
-              <a:rPr lang="en-US" b="1" dirty="0">
-                <a:latin typeface="Fira Code" panose="020B0809050000020004" pitchFamily="49" charset="0"/>
-                <a:ea typeface="Fira Code" panose="020B0809050000020004" pitchFamily="49" charset="0"/>
-                <a:cs typeface="Fira Code" panose="020B0809050000020004" pitchFamily="49" charset="0"/>
-              </a:rPr>
-              <a:t>	      payload: num</a:t>
-            </a:r>
-          </a:p>
-          <a:p>
-            <a:pPr algn="ctr"/>
-            <a:r>
-              <a:rPr lang="en-US" b="1" dirty="0">
-                <a:latin typeface="Fira Code" panose="020B0809050000020004" pitchFamily="49" charset="0"/>
-                <a:ea typeface="Fira Code" panose="020B0809050000020004" pitchFamily="49" charset="0"/>
-                <a:cs typeface="Fira Code" panose="020B0809050000020004" pitchFamily="49" charset="0"/>
-              </a:rPr>
-              <a:t>	}</a:t>
-            </a:r>
-          </a:p>
-          <a:p>
-            <a:pPr algn="ctr"/>
-            <a:r>
-              <a:rPr lang="en-US" b="1" dirty="0">
-                <a:latin typeface="Fira Code" panose="020B0809050000020004" pitchFamily="49" charset="0"/>
-                <a:ea typeface="Fira Code" panose="020B0809050000020004" pitchFamily="49" charset="0"/>
-                <a:cs typeface="Fira Code" panose="020B0809050000020004" pitchFamily="49" charset="0"/>
-              </a:rPr>
-              <a:t>}</a:t>
-            </a:r>
-            <a:endParaRPr lang="en-IN" b="1" dirty="0">
+              <a:t> const store = createStore ( rootReducers )</a:t>
+            </a:r>
+            <a:endParaRPr lang="en-IN" sz="2800" b="1" dirty="0">
               <a:latin typeface="Fira Code" panose="020B0809050000020004" pitchFamily="49" charset="0"/>
               <a:ea typeface="Fira Code" panose="020B0809050000020004" pitchFamily="49" charset="0"/>
               <a:cs typeface="Fira Code" panose="020B0809050000020004" pitchFamily="49" charset="0"/>
@@ -7778,88 +7744,10 @@
           </a:p>
         </p:txBody>
       </p:sp>
-      <p:sp>
-        <p:nvSpPr>
-          <p:cNvPr id="12" name="TextBox 11">
-            <a:extLst>
-              <a:ext uri="{FF2B5EF4-FFF2-40B4-BE49-F238E27FC236}">
-                <a16:creationId xmlns:a16="http://schemas.microsoft.com/office/drawing/2014/main" id="{EB01F33A-575A-D8E1-8827-9FD56C9A44A7}"/>
-              </a:ext>
-            </a:extLst>
-          </p:cNvPr>
-          <p:cNvSpPr txBox="1"/>
-          <p:nvPr/>
-        </p:nvSpPr>
-        <p:spPr>
-          <a:xfrm>
-            <a:off x="689264" y="4696689"/>
-            <a:ext cx="3300845" cy="1600438"/>
-          </a:xfrm>
-          <a:prstGeom prst="rect">
-            <a:avLst/>
-          </a:prstGeom>
-          <a:noFill/>
-        </p:spPr>
-        <p:txBody>
-          <a:bodyPr wrap="square" rtlCol="0">
-            <a:spAutoFit/>
-          </a:bodyPr>
-          <a:lstStyle/>
-          <a:p>
-            <a:pPr algn="ctr"/>
-            <a:r>
-              <a:rPr lang="en-US" sz="1400" b="1" dirty="0">
-                <a:solidFill>
-                  <a:schemeClr val="bg1"/>
-                </a:solidFill>
-                <a:latin typeface="Fira Code" panose="020B0809050000020004" pitchFamily="49" charset="0"/>
-                <a:ea typeface="Fira Code" panose="020B0809050000020004" pitchFamily="49" charset="0"/>
-                <a:cs typeface="Fira Code" panose="020B0809050000020004" pitchFamily="49" charset="0"/>
-              </a:rPr>
-              <a:t>This is Action Creator </a:t>
-            </a:r>
-            <a:r>
-              <a:rPr lang="en-US" sz="1400" b="1" dirty="0">
-                <a:solidFill>
-                  <a:schemeClr val="bg1"/>
-                </a:solidFill>
-                <a:latin typeface="Fira Code" panose="020B0809050000020004" pitchFamily="49" charset="0"/>
-                <a:ea typeface="Fira Code" panose="020B0809050000020004" pitchFamily="49" charset="0"/>
-                <a:cs typeface="Fira Code" panose="020B0809050000020004" pitchFamily="49" charset="0"/>
-                <a:sym typeface="Wingdings" panose="05000000000000000000" pitchFamily="2" charset="2"/>
-              </a:rPr>
-              <a:t></a:t>
-            </a:r>
-          </a:p>
-          <a:p>
-            <a:pPr algn="ctr"/>
-            <a:r>
-              <a:rPr lang="en-US" sz="1400" b="1" dirty="0">
-                <a:solidFill>
-                  <a:schemeClr val="bg1"/>
-                </a:solidFill>
-                <a:latin typeface="Fira Code" panose="020B0809050000020004" pitchFamily="49" charset="0"/>
-                <a:ea typeface="Fira Code" panose="020B0809050000020004" pitchFamily="49" charset="0"/>
-                <a:cs typeface="Fira Code" panose="020B0809050000020004" pitchFamily="49" charset="0"/>
-                <a:sym typeface="Wingdings" panose="05000000000000000000" pitchFamily="2" charset="2"/>
-              </a:rPr>
-              <a:t>This is a pure functions which creates an action and then returns that and it doesn’t have any side effect means it will not affect the code, outside of it’s scope</a:t>
-            </a:r>
-            <a:endParaRPr lang="en-IN" sz="1400" b="1" dirty="0">
-              <a:solidFill>
-                <a:schemeClr val="bg1"/>
-              </a:solidFill>
-              <a:latin typeface="Fira Code" panose="020B0809050000020004" pitchFamily="49" charset="0"/>
-              <a:ea typeface="Fira Code" panose="020B0809050000020004" pitchFamily="49" charset="0"/>
-              <a:cs typeface="Fira Code" panose="020B0809050000020004" pitchFamily="49" charset="0"/>
-            </a:endParaRPr>
-          </a:p>
-        </p:txBody>
-      </p:sp>
     </p:spTree>
     <p:extLst>
       <p:ext uri="{BB962C8B-B14F-4D97-AF65-F5344CB8AC3E}">
-        <p14:creationId xmlns:p14="http://schemas.microsoft.com/office/powerpoint/2010/main" val="3144717354"/>
+        <p14:creationId xmlns:p14="http://schemas.microsoft.com/office/powerpoint/2010/main" val="2706294485"/>
       </p:ext>
     </p:extLst>
   </p:cSld>
@@ -7888,10 +7776,10 @@
       </p:grpSpPr>
       <p:sp>
         <p:nvSpPr>
-          <p:cNvPr id="4" name="TextBox 3">
-            <a:extLst>
-              <a:ext uri="{FF2B5EF4-FFF2-40B4-BE49-F238E27FC236}">
-                <a16:creationId xmlns:a16="http://schemas.microsoft.com/office/drawing/2014/main" id="{E4CD65F1-864C-6DAA-DE89-28DE3A12A07C}"/>
+          <p:cNvPr id="5" name="TextBox 4">
+            <a:extLst>
+              <a:ext uri="{FF2B5EF4-FFF2-40B4-BE49-F238E27FC236}">
+                <a16:creationId xmlns:a16="http://schemas.microsoft.com/office/drawing/2014/main" id="{956FA74A-B67F-7214-3E2C-71A263607B0D}"/>
               </a:ext>
             </a:extLst>
           </p:cNvPr>
@@ -7900,64 +7788,7 @@
         </p:nvSpPr>
         <p:spPr>
           <a:xfrm>
-            <a:off x="249381" y="138545"/>
-            <a:ext cx="11693237" cy="369332"/>
-          </a:xfrm>
-          <a:prstGeom prst="rect">
-            <a:avLst/>
-          </a:prstGeom>
-          <a:noFill/>
-        </p:spPr>
-        <p:txBody>
-          <a:bodyPr wrap="square" rtlCol="0">
-            <a:spAutoFit/>
-          </a:bodyPr>
-          <a:lstStyle/>
-          <a:p>
-            <a:pPr algn="ctr"/>
-            <a:r>
-              <a:rPr lang="en-US" dirty="0">
-                <a:solidFill>
-                  <a:srgbClr val="FF0000"/>
-                </a:solidFill>
-                <a:highlight>
-                  <a:srgbClr val="FFFF00"/>
-                </a:highlight>
-                <a:latin typeface="Fira Code" panose="020B0809050000020004" pitchFamily="49" charset="0"/>
-                <a:ea typeface="Fira Code" panose="020B0809050000020004" pitchFamily="49" charset="0"/>
-                <a:cs typeface="Fira Code" panose="020B0809050000020004" pitchFamily="49" charset="0"/>
-              </a:rPr>
-              <a:t>Let’s now explore the steps of using Redux with React to manage the state Globally.</a:t>
-            </a:r>
-            <a:endParaRPr lang="en-IN" dirty="0">
-              <a:solidFill>
-                <a:srgbClr val="FF0000"/>
-              </a:solidFill>
-              <a:highlight>
-                <a:srgbClr val="FFFF00"/>
-              </a:highlight>
-              <a:latin typeface="Fira Code" panose="020B0809050000020004" pitchFamily="49" charset="0"/>
-              <a:ea typeface="Fira Code" panose="020B0809050000020004" pitchFamily="49" charset="0"/>
-              <a:cs typeface="Fira Code" panose="020B0809050000020004" pitchFamily="49" charset="0"/>
-            </a:endParaRPr>
-          </a:p>
-        </p:txBody>
-      </p:sp>
-      <p:sp>
-        <p:nvSpPr>
-          <p:cNvPr id="5" name="TextBox 4">
-            <a:extLst>
-              <a:ext uri="{FF2B5EF4-FFF2-40B4-BE49-F238E27FC236}">
-                <a16:creationId xmlns:a16="http://schemas.microsoft.com/office/drawing/2014/main" id="{51F1D5CB-D6F5-A25C-1E2E-8EF9011443B5}"/>
-              </a:ext>
-            </a:extLst>
-          </p:cNvPr>
-          <p:cNvSpPr txBox="1"/>
-          <p:nvPr/>
-        </p:nvSpPr>
-        <p:spPr>
-          <a:xfrm>
-            <a:off x="1371600" y="538163"/>
+            <a:off x="1330036" y="304370"/>
             <a:ext cx="8506691" cy="523220"/>
           </a:xfrm>
           <a:prstGeom prst="rect">
@@ -8172,7 +8003,7 @@
           <p:cNvPr id="6" name="TextBox 5">
             <a:extLst>
               <a:ext uri="{FF2B5EF4-FFF2-40B4-BE49-F238E27FC236}">
-                <a16:creationId xmlns:a16="http://schemas.microsoft.com/office/drawing/2014/main" id="{94CF6B2D-1361-7E34-5E09-A268EE937C9D}"/>
+                <a16:creationId xmlns:a16="http://schemas.microsoft.com/office/drawing/2014/main" id="{03266006-A4B0-790E-3CF5-9312EAFF0A33}"/>
               </a:ext>
             </a:extLst>
           </p:cNvPr>
@@ -8181,8 +8012,8 @@
         </p:nvSpPr>
         <p:spPr>
           <a:xfrm>
-            <a:off x="374072" y="1096592"/>
-            <a:ext cx="11568546" cy="646331"/>
+            <a:off x="374072" y="1070358"/>
+            <a:ext cx="11568546" cy="1200329"/>
           </a:xfrm>
           <a:prstGeom prst="rect">
             <a:avLst/>
@@ -8206,7 +8037,7 @@
                 <a:ea typeface="Fira Code" panose="020B0809050000020004" pitchFamily="49" charset="0"/>
                 <a:cs typeface="Fira Code" panose="020B0809050000020004" pitchFamily="49" charset="0"/>
               </a:rPr>
-              <a:t>Creating the Reducer: </a:t>
+              <a:t>Creating the Action with the Action Creator: </a:t>
             </a:r>
             <a:r>
               <a:rPr lang="en-US" dirty="0">
@@ -8217,7 +8048,78 @@
                 <a:ea typeface="Fira Code" panose="020B0809050000020004" pitchFamily="49" charset="0"/>
                 <a:cs typeface="Fira Code" panose="020B0809050000020004" pitchFamily="49" charset="0"/>
               </a:rPr>
-              <a:t>Reducers are the functions that take the current state and an action as arguments, and return new state as result</a:t>
+              <a:t>Actions are plain JavaScript objects which have two properties </a:t>
+            </a:r>
+            <a:r>
+              <a:rPr lang="en-US" dirty="0">
+                <a:solidFill>
+                  <a:schemeClr val="bg1"/>
+                </a:solidFill>
+                <a:latin typeface="Fira Code" panose="020B0809050000020004" pitchFamily="49" charset="0"/>
+                <a:ea typeface="Fira Code" panose="020B0809050000020004" pitchFamily="49" charset="0"/>
+                <a:cs typeface="Fira Code" panose="020B0809050000020004" pitchFamily="49" charset="0"/>
+                <a:sym typeface="Wingdings" panose="05000000000000000000" pitchFamily="2" charset="2"/>
+              </a:rPr>
+              <a:t> </a:t>
+            </a:r>
+            <a:r>
+              <a:rPr lang="en-US" b="1" i="1" u="sng" dirty="0">
+                <a:solidFill>
+                  <a:schemeClr val="bg1"/>
+                </a:solidFill>
+                <a:latin typeface="Fira Code" panose="020B0809050000020004" pitchFamily="49" charset="0"/>
+                <a:ea typeface="Fira Code" panose="020B0809050000020004" pitchFamily="49" charset="0"/>
+                <a:cs typeface="Fira Code" panose="020B0809050000020004" pitchFamily="49" charset="0"/>
+                <a:sym typeface="Wingdings" panose="05000000000000000000" pitchFamily="2" charset="2"/>
+              </a:rPr>
+              <a:t>type and payload</a:t>
+            </a:r>
+            <a:r>
+              <a:rPr lang="en-US" dirty="0">
+                <a:solidFill>
+                  <a:schemeClr val="bg1"/>
+                </a:solidFill>
+                <a:latin typeface="Fira Code" panose="020B0809050000020004" pitchFamily="49" charset="0"/>
+                <a:ea typeface="Fira Code" panose="020B0809050000020004" pitchFamily="49" charset="0"/>
+                <a:cs typeface="Fira Code" panose="020B0809050000020004" pitchFamily="49" charset="0"/>
+                <a:sym typeface="Wingdings" panose="05000000000000000000" pitchFamily="2" charset="2"/>
+              </a:rPr>
+              <a:t> (</a:t>
+            </a:r>
+            <a:r>
+              <a:rPr lang="en-US" b="1" u="sng" dirty="0">
+                <a:solidFill>
+                  <a:schemeClr val="bg1"/>
+                </a:solidFill>
+                <a:latin typeface="Fira Code" panose="020B0809050000020004" pitchFamily="49" charset="0"/>
+                <a:ea typeface="Fira Code" panose="020B0809050000020004" pitchFamily="49" charset="0"/>
+                <a:cs typeface="Fira Code" panose="020B0809050000020004" pitchFamily="49" charset="0"/>
+                <a:sym typeface="Wingdings" panose="05000000000000000000" pitchFamily="2" charset="2"/>
+              </a:rPr>
+              <a:t>type is like unique action type and payload is the data that if we want to pass to the store then we can put it inside the payload</a:t>
+            </a:r>
+            <a:r>
+              <a:rPr lang="en-US" dirty="0">
+                <a:solidFill>
+                  <a:schemeClr val="bg1"/>
+                </a:solidFill>
+                <a:latin typeface="Fira Code" panose="020B0809050000020004" pitchFamily="49" charset="0"/>
+                <a:ea typeface="Fira Code" panose="020B0809050000020004" pitchFamily="49" charset="0"/>
+                <a:cs typeface="Fira Code" panose="020B0809050000020004" pitchFamily="49" charset="0"/>
+                <a:sym typeface="Wingdings" panose="05000000000000000000" pitchFamily="2" charset="2"/>
+              </a:rPr>
+              <a:t>)</a:t>
+            </a:r>
+            <a:r>
+              <a:rPr lang="en-US" dirty="0">
+                <a:solidFill>
+                  <a:schemeClr val="bg1"/>
+                </a:solidFill>
+                <a:latin typeface="Fira Code" panose="020B0809050000020004" pitchFamily="49" charset="0"/>
+                <a:ea typeface="Fira Code" panose="020B0809050000020004" pitchFamily="49" charset="0"/>
+                <a:cs typeface="Fira Code" panose="020B0809050000020004" pitchFamily="49" charset="0"/>
+              </a:rPr>
+              <a:t>. Actions only can tell what to do but not how to do it.</a:t>
             </a:r>
             <a:endParaRPr lang="en-IN" dirty="0">
               <a:solidFill>
@@ -8235,7 +8137,7 @@
           <p:cNvPr id="7" name="TextBox 6">
             <a:extLst>
               <a:ext uri="{FF2B5EF4-FFF2-40B4-BE49-F238E27FC236}">
-                <a16:creationId xmlns:a16="http://schemas.microsoft.com/office/drawing/2014/main" id="{7836D786-09E5-5038-201D-735A1A6071B1}"/>
+                <a16:creationId xmlns:a16="http://schemas.microsoft.com/office/drawing/2014/main" id="{9EFA455A-2091-13A4-7B75-2F31D4389006}"/>
               </a:ext>
             </a:extLst>
           </p:cNvPr>
@@ -8244,8 +8146,229 @@
         </p:nvSpPr>
         <p:spPr>
           <a:xfrm>
-            <a:off x="606136" y="1970061"/>
-            <a:ext cx="11083636" cy="2554545"/>
+            <a:off x="311727" y="2570302"/>
+            <a:ext cx="11568546" cy="1200329"/>
+          </a:xfrm>
+          <a:prstGeom prst="rect">
+            <a:avLst/>
+          </a:prstGeom>
+          <a:solidFill>
+            <a:srgbClr val="0070C0"/>
+          </a:solidFill>
+        </p:spPr>
+        <p:txBody>
+          <a:bodyPr wrap="square" rtlCol="0">
+            <a:spAutoFit/>
+          </a:bodyPr>
+          <a:lstStyle/>
+          <a:p>
+            <a:pPr algn="ctr"/>
+            <a:r>
+              <a:rPr lang="en-US" b="1" dirty="0">
+                <a:solidFill>
+                  <a:schemeClr val="bg1"/>
+                </a:solidFill>
+                <a:latin typeface="Fira Code" panose="020B0809050000020004" pitchFamily="49" charset="0"/>
+                <a:ea typeface="Fira Code" panose="020B0809050000020004" pitchFamily="49" charset="0"/>
+                <a:cs typeface="Fira Code" panose="020B0809050000020004" pitchFamily="49" charset="0"/>
+              </a:rPr>
+              <a:t>return {</a:t>
+            </a:r>
+          </a:p>
+          <a:p>
+            <a:pPr algn="ctr"/>
+            <a:r>
+              <a:rPr lang="en-US" b="1" dirty="0">
+                <a:solidFill>
+                  <a:schemeClr val="bg1"/>
+                </a:solidFill>
+                <a:latin typeface="Fira Code" panose="020B0809050000020004" pitchFamily="49" charset="0"/>
+                <a:ea typeface="Fira Code" panose="020B0809050000020004" pitchFamily="49" charset="0"/>
+                <a:cs typeface="Fira Code" panose="020B0809050000020004" pitchFamily="49" charset="0"/>
+              </a:rPr>
+              <a:t>		     type: “Increment”,</a:t>
+            </a:r>
+          </a:p>
+          <a:p>
+            <a:pPr algn="ctr"/>
+            <a:r>
+              <a:rPr lang="en-US" b="1" dirty="0">
+                <a:solidFill>
+                  <a:schemeClr val="bg1"/>
+                </a:solidFill>
+                <a:latin typeface="Fira Code" panose="020B0809050000020004" pitchFamily="49" charset="0"/>
+                <a:ea typeface="Fira Code" panose="020B0809050000020004" pitchFamily="49" charset="0"/>
+                <a:cs typeface="Fira Code" panose="020B0809050000020004" pitchFamily="49" charset="0"/>
+              </a:rPr>
+              <a:t>		payload: num</a:t>
+            </a:r>
+          </a:p>
+          <a:p>
+            <a:pPr algn="ctr"/>
+            <a:r>
+              <a:rPr lang="en-US" b="1" dirty="0">
+                <a:solidFill>
+                  <a:schemeClr val="bg1"/>
+                </a:solidFill>
+                <a:latin typeface="Fira Code" panose="020B0809050000020004" pitchFamily="49" charset="0"/>
+                <a:ea typeface="Fira Code" panose="020B0809050000020004" pitchFamily="49" charset="0"/>
+                <a:cs typeface="Fira Code" panose="020B0809050000020004" pitchFamily="49" charset="0"/>
+              </a:rPr>
+              <a:t>}</a:t>
+            </a:r>
+            <a:endParaRPr lang="en-IN" dirty="0">
+              <a:solidFill>
+                <a:schemeClr val="bg1"/>
+              </a:solidFill>
+              <a:latin typeface="Fira Code" panose="020B0809050000020004" pitchFamily="49" charset="0"/>
+              <a:ea typeface="Fira Code" panose="020B0809050000020004" pitchFamily="49" charset="0"/>
+              <a:cs typeface="Fira Code" panose="020B0809050000020004" pitchFamily="49" charset="0"/>
+            </a:endParaRPr>
+          </a:p>
+        </p:txBody>
+      </p:sp>
+      <p:sp>
+        <p:nvSpPr>
+          <p:cNvPr id="8" name="TextBox 7">
+            <a:extLst>
+              <a:ext uri="{FF2B5EF4-FFF2-40B4-BE49-F238E27FC236}">
+                <a16:creationId xmlns:a16="http://schemas.microsoft.com/office/drawing/2014/main" id="{1D352639-F721-C469-7888-E5078D8B149E}"/>
+              </a:ext>
+            </a:extLst>
+          </p:cNvPr>
+          <p:cNvSpPr txBox="1"/>
+          <p:nvPr/>
+        </p:nvSpPr>
+        <p:spPr>
+          <a:xfrm>
+            <a:off x="581891" y="2888127"/>
+            <a:ext cx="3117273" cy="369332"/>
+          </a:xfrm>
+          <a:prstGeom prst="rect">
+            <a:avLst/>
+          </a:prstGeom>
+          <a:noFill/>
+        </p:spPr>
+        <p:txBody>
+          <a:bodyPr wrap="square" rtlCol="0">
+            <a:spAutoFit/>
+          </a:bodyPr>
+          <a:lstStyle/>
+          <a:p>
+            <a:pPr algn="ctr"/>
+            <a:r>
+              <a:rPr lang="en-US" b="1" dirty="0">
+                <a:solidFill>
+                  <a:schemeClr val="bg1"/>
+                </a:solidFill>
+                <a:latin typeface="Fira Code" panose="020B0809050000020004" pitchFamily="49" charset="0"/>
+                <a:ea typeface="Fira Code" panose="020B0809050000020004" pitchFamily="49" charset="0"/>
+                <a:cs typeface="Fira Code" panose="020B0809050000020004" pitchFamily="49" charset="0"/>
+              </a:rPr>
+              <a:t>This is Action </a:t>
+            </a:r>
+            <a:r>
+              <a:rPr lang="en-US" b="1" dirty="0">
+                <a:solidFill>
+                  <a:schemeClr val="bg1"/>
+                </a:solidFill>
+                <a:latin typeface="Fira Code" panose="020B0809050000020004" pitchFamily="49" charset="0"/>
+                <a:ea typeface="Fira Code" panose="020B0809050000020004" pitchFamily="49" charset="0"/>
+                <a:cs typeface="Fira Code" panose="020B0809050000020004" pitchFamily="49" charset="0"/>
+                <a:sym typeface="Wingdings" panose="05000000000000000000" pitchFamily="2" charset="2"/>
+              </a:rPr>
+              <a:t></a:t>
+            </a:r>
+            <a:endParaRPr lang="en-IN" b="1" dirty="0">
+              <a:solidFill>
+                <a:schemeClr val="bg1"/>
+              </a:solidFill>
+              <a:latin typeface="Fira Code" panose="020B0809050000020004" pitchFamily="49" charset="0"/>
+              <a:ea typeface="Fira Code" panose="020B0809050000020004" pitchFamily="49" charset="0"/>
+              <a:cs typeface="Fira Code" panose="020B0809050000020004" pitchFamily="49" charset="0"/>
+            </a:endParaRPr>
+          </a:p>
+        </p:txBody>
+      </p:sp>
+      <p:sp>
+        <p:nvSpPr>
+          <p:cNvPr id="10" name="TextBox 9">
+            <a:extLst>
+              <a:ext uri="{FF2B5EF4-FFF2-40B4-BE49-F238E27FC236}">
+                <a16:creationId xmlns:a16="http://schemas.microsoft.com/office/drawing/2014/main" id="{CA7B242E-6D17-1A68-2F3B-2E24E0A19A60}"/>
+              </a:ext>
+            </a:extLst>
+          </p:cNvPr>
+          <p:cNvSpPr txBox="1"/>
+          <p:nvPr/>
+        </p:nvSpPr>
+        <p:spPr>
+          <a:xfrm>
+            <a:off x="394854" y="4740217"/>
+            <a:ext cx="4107873" cy="369332"/>
+          </a:xfrm>
+          <a:prstGeom prst="rect">
+            <a:avLst/>
+          </a:prstGeom>
+          <a:noFill/>
+        </p:spPr>
+        <p:txBody>
+          <a:bodyPr wrap="square" rtlCol="0">
+            <a:spAutoFit/>
+          </a:bodyPr>
+          <a:lstStyle/>
+          <a:p>
+            <a:pPr algn="ctr"/>
+            <a:r>
+              <a:rPr lang="en-US" b="1" dirty="0">
+                <a:solidFill>
+                  <a:schemeClr val="bg1"/>
+                </a:solidFill>
+                <a:latin typeface="Fira Code" panose="020B0809050000020004" pitchFamily="49" charset="0"/>
+                <a:ea typeface="Fira Code" panose="020B0809050000020004" pitchFamily="49" charset="0"/>
+                <a:cs typeface="Fira Code" panose="020B0809050000020004" pitchFamily="49" charset="0"/>
+              </a:rPr>
+              <a:t>This is Action Creator </a:t>
+            </a:r>
+            <a:r>
+              <a:rPr lang="en-US" b="1" dirty="0">
+                <a:solidFill>
+                  <a:schemeClr val="bg1"/>
+                </a:solidFill>
+                <a:latin typeface="Fira Code" panose="020B0809050000020004" pitchFamily="49" charset="0"/>
+                <a:ea typeface="Fira Code" panose="020B0809050000020004" pitchFamily="49" charset="0"/>
+                <a:cs typeface="Fira Code" panose="020B0809050000020004" pitchFamily="49" charset="0"/>
+                <a:sym typeface="Wingdings" panose="05000000000000000000" pitchFamily="2" charset="2"/>
+              </a:rPr>
+              <a:t></a:t>
+            </a:r>
+            <a:endParaRPr lang="en-IN" b="1" dirty="0">
+              <a:solidFill>
+                <a:schemeClr val="bg1"/>
+              </a:solidFill>
+              <a:latin typeface="Fira Code" panose="020B0809050000020004" pitchFamily="49" charset="0"/>
+              <a:ea typeface="Fira Code" panose="020B0809050000020004" pitchFamily="49" charset="0"/>
+              <a:cs typeface="Fira Code" panose="020B0809050000020004" pitchFamily="49" charset="0"/>
+            </a:endParaRPr>
+          </a:p>
+        </p:txBody>
+      </p:sp>
+      <p:sp>
+        <p:nvSpPr>
+          <p:cNvPr id="11" name="TextBox 10">
+            <a:extLst>
+              <a:ext uri="{FF2B5EF4-FFF2-40B4-BE49-F238E27FC236}">
+                <a16:creationId xmlns:a16="http://schemas.microsoft.com/office/drawing/2014/main" id="{256A95A3-159D-4A3E-499C-15BA7DE385F4}"/>
+              </a:ext>
+            </a:extLst>
+          </p:cNvPr>
+          <p:cNvSpPr txBox="1"/>
+          <p:nvPr/>
+        </p:nvSpPr>
+        <p:spPr>
+          <a:xfrm>
+            <a:off x="644237" y="4232386"/>
+            <a:ext cx="11236036" cy="1754326"/>
           </a:xfrm>
           <a:prstGeom prst="rect">
             <a:avLst/>
@@ -8260,85 +8383,71 @@
           </a:bodyPr>
           <a:lstStyle/>
           <a:p>
-            <a:r>
-              <a:rPr lang="en-US" sz="2000" b="1" dirty="0">
+            <a:pPr algn="ctr"/>
+            <a:r>
+              <a:rPr lang="en-US" b="1" dirty="0">
                 <a:latin typeface="Fira Code" panose="020B0809050000020004" pitchFamily="49" charset="0"/>
                 <a:ea typeface="Fira Code" panose="020B0809050000020004" pitchFamily="49" charset="0"/>
                 <a:cs typeface="Fira Code" panose="020B0809050000020004" pitchFamily="49" charset="0"/>
               </a:rPr>
-              <a:t>const inititalState = 0</a:t>
-            </a:r>
-          </a:p>
-          <a:p>
-            <a:r>
-              <a:rPr lang="en-US" sz="2000" b="1" dirty="0">
+              <a:t>export const incNumberBy = (num) =&gt;{</a:t>
+            </a:r>
+          </a:p>
+          <a:p>
+            <a:pPr algn="ctr"/>
+            <a:r>
+              <a:rPr lang="en-US" b="1" dirty="0">
                 <a:latin typeface="Fira Code" panose="020B0809050000020004" pitchFamily="49" charset="0"/>
                 <a:ea typeface="Fira Code" panose="020B0809050000020004" pitchFamily="49" charset="0"/>
                 <a:cs typeface="Fira Code" panose="020B0809050000020004" pitchFamily="49" charset="0"/>
               </a:rPr>
-              <a:t>const changeTheNumber = (state = initialState, action) =&gt; {</a:t>
-            </a:r>
-          </a:p>
-          <a:p>
-            <a:r>
-              <a:rPr lang="en-US" sz="2000" b="1" dirty="0">
+              <a:t>	return {</a:t>
+            </a:r>
+          </a:p>
+          <a:p>
+            <a:pPr algn="ctr"/>
+            <a:r>
+              <a:rPr lang="en-US" b="1" dirty="0">
                 <a:latin typeface="Fira Code" panose="020B0809050000020004" pitchFamily="49" charset="0"/>
                 <a:ea typeface="Fira Code" panose="020B0809050000020004" pitchFamily="49" charset="0"/>
                 <a:cs typeface="Fira Code" panose="020B0809050000020004" pitchFamily="49" charset="0"/>
               </a:rPr>
-              <a:t>	switch (action.type) {</a:t>
-            </a:r>
-          </a:p>
-          <a:p>
-            <a:r>
-              <a:rPr lang="en-US" sz="2000" b="1" dirty="0">
+              <a:t>	     type: “INCREMENT”,</a:t>
+            </a:r>
+          </a:p>
+          <a:p>
+            <a:pPr algn="ctr"/>
+            <a:r>
+              <a:rPr lang="en-US" b="1" dirty="0">
                 <a:latin typeface="Fira Code" panose="020B0809050000020004" pitchFamily="49" charset="0"/>
                 <a:ea typeface="Fira Code" panose="020B0809050000020004" pitchFamily="49" charset="0"/>
                 <a:cs typeface="Fira Code" panose="020B0809050000020004" pitchFamily="49" charset="0"/>
               </a:rPr>
-              <a:t>	    case “INCREMENT”: return state + action.payload;</a:t>
-            </a:r>
-          </a:p>
-          <a:p>
-            <a:r>
-              <a:rPr lang="en-US" sz="2000" b="1" dirty="0">
+              <a:t>	      payload: num</a:t>
+            </a:r>
+          </a:p>
+          <a:p>
+            <a:pPr algn="ctr"/>
+            <a:r>
+              <a:rPr lang="en-US" b="1" dirty="0">
                 <a:latin typeface="Fira Code" panose="020B0809050000020004" pitchFamily="49" charset="0"/>
                 <a:ea typeface="Fira Code" panose="020B0809050000020004" pitchFamily="49" charset="0"/>
                 <a:cs typeface="Fira Code" panose="020B0809050000020004" pitchFamily="49" charset="0"/>
               </a:rPr>
-              <a:t>	    case “DECREMENT”: return state – 1;</a:t>
-            </a:r>
-          </a:p>
-          <a:p>
-            <a:r>
-              <a:rPr lang="en-US" sz="2000" b="1" dirty="0">
+              <a:t>	}</a:t>
+            </a:r>
+          </a:p>
+          <a:p>
+            <a:pPr algn="ctr"/>
+            <a:r>
+              <a:rPr lang="en-US" b="1" dirty="0">
                 <a:latin typeface="Fira Code" panose="020B0809050000020004" pitchFamily="49" charset="0"/>
                 <a:ea typeface="Fira Code" panose="020B0809050000020004" pitchFamily="49" charset="0"/>
                 <a:cs typeface="Fira Code" panose="020B0809050000020004" pitchFamily="49" charset="0"/>
               </a:rPr>
-              <a:t>	    default: return state;</a:t>
-            </a:r>
-          </a:p>
-          <a:p>
-            <a:r>
-              <a:rPr lang="en-US" sz="2000" b="1" dirty="0">
-                <a:latin typeface="Fira Code" panose="020B0809050000020004" pitchFamily="49" charset="0"/>
-                <a:ea typeface="Fira Code" panose="020B0809050000020004" pitchFamily="49" charset="0"/>
-                <a:cs typeface="Fira Code" panose="020B0809050000020004" pitchFamily="49" charset="0"/>
-              </a:rPr>
-              <a:t>    }</a:t>
-            </a:r>
-          </a:p>
-          <a:p>
-            <a:r>
-              <a:rPr lang="en-US" sz="2000" b="1" dirty="0">
-                <a:latin typeface="Fira Code" panose="020B0809050000020004" pitchFamily="49" charset="0"/>
-                <a:ea typeface="Fira Code" panose="020B0809050000020004" pitchFamily="49" charset="0"/>
-                <a:cs typeface="Fira Code" panose="020B0809050000020004" pitchFamily="49" charset="0"/>
-              </a:rPr>
-              <a:t>} </a:t>
-            </a:r>
-            <a:endParaRPr lang="en-IN" sz="2000" b="1" dirty="0">
+              <a:t>}</a:t>
+            </a:r>
+            <a:endParaRPr lang="en-IN" b="1" dirty="0">
               <a:latin typeface="Fira Code" panose="020B0809050000020004" pitchFamily="49" charset="0"/>
               <a:ea typeface="Fira Code" panose="020B0809050000020004" pitchFamily="49" charset="0"/>
               <a:cs typeface="Fira Code" panose="020B0809050000020004" pitchFamily="49" charset="0"/>
@@ -8348,10 +8457,10 @@
       </p:sp>
       <p:sp>
         <p:nvSpPr>
-          <p:cNvPr id="8" name="TextBox 7">
-            <a:extLst>
-              <a:ext uri="{FF2B5EF4-FFF2-40B4-BE49-F238E27FC236}">
-                <a16:creationId xmlns:a16="http://schemas.microsoft.com/office/drawing/2014/main" id="{21507469-CD4F-AA25-A718-FA025B1BFD7B}"/>
+          <p:cNvPr id="12" name="TextBox 11">
+            <a:extLst>
+              <a:ext uri="{FF2B5EF4-FFF2-40B4-BE49-F238E27FC236}">
+                <a16:creationId xmlns:a16="http://schemas.microsoft.com/office/drawing/2014/main" id="{EB01F33A-575A-D8E1-8827-9FD56C9A44A7}"/>
               </a:ext>
             </a:extLst>
           </p:cNvPr>
@@ -8360,15 +8469,13 @@
         </p:nvSpPr>
         <p:spPr>
           <a:xfrm>
-            <a:off x="606136" y="4637145"/>
-            <a:ext cx="11083636" cy="646331"/>
+            <a:off x="581891" y="4309330"/>
+            <a:ext cx="3300845" cy="1600438"/>
           </a:xfrm>
           <a:prstGeom prst="rect">
             <a:avLst/>
           </a:prstGeom>
-          <a:solidFill>
-            <a:schemeClr val="tx1"/>
-          </a:solidFill>
+          <a:noFill/>
         </p:spPr>
         <p:txBody>
           <a:bodyPr wrap="square" rtlCol="0">
@@ -8376,100 +8483,49 @@
           </a:bodyPr>
           <a:lstStyle/>
           <a:p>
-            <a:r>
-              <a:rPr lang="en-US" dirty="0">
+            <a:pPr algn="ctr"/>
+            <a:r>
+              <a:rPr lang="en-US" sz="1400" b="1" dirty="0">
                 <a:solidFill>
                   <a:schemeClr val="bg1"/>
                 </a:solidFill>
-              </a:rPr>
-              <a:t>If we have more than one reducer then we can combine all the reducers to the rootReducer. For this we need a function combineReducers (which we have to import from “redux library”). Now let’s have a look on how to do it </a:t>
-            </a:r>
-            <a:r>
-              <a:rPr lang="en-US" dirty="0">
+                <a:latin typeface="Fira Code" panose="020B0809050000020004" pitchFamily="49" charset="0"/>
+                <a:ea typeface="Fira Code" panose="020B0809050000020004" pitchFamily="49" charset="0"/>
+                <a:cs typeface="Fira Code" panose="020B0809050000020004" pitchFamily="49" charset="0"/>
+              </a:rPr>
+              <a:t>This is Action Creator </a:t>
+            </a:r>
+            <a:r>
+              <a:rPr lang="en-US" sz="1400" b="1" dirty="0">
                 <a:solidFill>
                   <a:schemeClr val="bg1"/>
                 </a:solidFill>
+                <a:latin typeface="Fira Code" panose="020B0809050000020004" pitchFamily="49" charset="0"/>
+                <a:ea typeface="Fira Code" panose="020B0809050000020004" pitchFamily="49" charset="0"/>
+                <a:cs typeface="Fira Code" panose="020B0809050000020004" pitchFamily="49" charset="0"/>
                 <a:sym typeface="Wingdings" panose="05000000000000000000" pitchFamily="2" charset="2"/>
               </a:rPr>
-              <a:t></a:t>
-            </a:r>
-            <a:endParaRPr lang="en-IN" dirty="0">
+              <a:t></a:t>
+            </a:r>
+          </a:p>
+          <a:p>
+            <a:pPr algn="ctr"/>
+            <a:r>
+              <a:rPr lang="en-US" sz="1400" b="1" dirty="0">
+                <a:solidFill>
+                  <a:schemeClr val="bg1"/>
+                </a:solidFill>
+                <a:latin typeface="Fira Code" panose="020B0809050000020004" pitchFamily="49" charset="0"/>
+                <a:ea typeface="Fira Code" panose="020B0809050000020004" pitchFamily="49" charset="0"/>
+                <a:cs typeface="Fira Code" panose="020B0809050000020004" pitchFamily="49" charset="0"/>
+                <a:sym typeface="Wingdings" panose="05000000000000000000" pitchFamily="2" charset="2"/>
+              </a:rPr>
+              <a:t>This is a pure functions which creates an action and then returns that and it doesn’t have any side effect means it will not affect the code, outside of it’s scope</a:t>
+            </a:r>
+            <a:endParaRPr lang="en-IN" sz="1400" b="1" dirty="0">
               <a:solidFill>
                 <a:schemeClr val="bg1"/>
               </a:solidFill>
-            </a:endParaRPr>
-          </a:p>
-        </p:txBody>
-      </p:sp>
-      <p:sp>
-        <p:nvSpPr>
-          <p:cNvPr id="2" name="TextBox 1">
-            <a:extLst>
-              <a:ext uri="{FF2B5EF4-FFF2-40B4-BE49-F238E27FC236}">
-                <a16:creationId xmlns:a16="http://schemas.microsoft.com/office/drawing/2014/main" id="{C98CA44B-45F2-D780-48A8-C06D71D13918}"/>
-              </a:ext>
-            </a:extLst>
-          </p:cNvPr>
-          <p:cNvSpPr txBox="1"/>
-          <p:nvPr/>
-        </p:nvSpPr>
-        <p:spPr>
-          <a:xfrm>
-            <a:off x="564572" y="5396016"/>
-            <a:ext cx="11187546" cy="1323439"/>
-          </a:xfrm>
-          <a:prstGeom prst="rect">
-            <a:avLst/>
-          </a:prstGeom>
-          <a:solidFill>
-            <a:srgbClr val="92D050"/>
-          </a:solidFill>
-        </p:spPr>
-        <p:txBody>
-          <a:bodyPr wrap="square" rtlCol="0">
-            <a:spAutoFit/>
-          </a:bodyPr>
-          <a:lstStyle/>
-          <a:p>
-            <a:r>
-              <a:rPr lang="en-US" sz="2000" b="1" dirty="0">
-                <a:latin typeface="Fira Code" panose="020B0809050000020004" pitchFamily="49" charset="0"/>
-                <a:ea typeface="Fira Code" panose="020B0809050000020004" pitchFamily="49" charset="0"/>
-                <a:cs typeface="Fira Code" panose="020B0809050000020004" pitchFamily="49" charset="0"/>
-              </a:rPr>
-              <a:t> import { combineReducers } form “redux”;</a:t>
-            </a:r>
-          </a:p>
-          <a:p>
-            <a:r>
-              <a:rPr lang="en-US" sz="2000" b="1" dirty="0">
-                <a:latin typeface="Fira Code" panose="020B0809050000020004" pitchFamily="49" charset="0"/>
-                <a:ea typeface="Fira Code" panose="020B0809050000020004" pitchFamily="49" charset="0"/>
-                <a:cs typeface="Fira Code" panose="020B0809050000020004" pitchFamily="49" charset="0"/>
-              </a:rPr>
-              <a:t> export const rootReducer = combineReducers({</a:t>
-            </a:r>
-          </a:p>
-          <a:p>
-            <a:r>
-              <a:rPr lang="en-US" sz="2000" b="1" dirty="0">
-                <a:latin typeface="Fira Code" panose="020B0809050000020004" pitchFamily="49" charset="0"/>
-                <a:ea typeface="Fira Code" panose="020B0809050000020004" pitchFamily="49" charset="0"/>
-                <a:cs typeface="Fira Code" panose="020B0809050000020004" pitchFamily="49" charset="0"/>
-              </a:rPr>
-              <a:t> changeTheNumber, second reducer if we have any and so on</a:t>
-            </a:r>
-          </a:p>
-          <a:p>
-            <a:r>
-              <a:rPr lang="en-US" sz="2000" b="1" dirty="0">
-                <a:latin typeface="Fira Code" panose="020B0809050000020004" pitchFamily="49" charset="0"/>
-                <a:ea typeface="Fira Code" panose="020B0809050000020004" pitchFamily="49" charset="0"/>
-                <a:cs typeface="Fira Code" panose="020B0809050000020004" pitchFamily="49" charset="0"/>
-              </a:rPr>
-              <a:t>})</a:t>
-            </a:r>
-            <a:endParaRPr lang="en-IN" sz="2000" b="1" dirty="0">
               <a:latin typeface="Fira Code" panose="020B0809050000020004" pitchFamily="49" charset="0"/>
               <a:ea typeface="Fira Code" panose="020B0809050000020004" pitchFamily="49" charset="0"/>
               <a:cs typeface="Fira Code" panose="020B0809050000020004" pitchFamily="49" charset="0"/>
@@ -8480,7 +8536,7 @@
     </p:spTree>
     <p:extLst>
       <p:ext uri="{BB962C8B-B14F-4D97-AF65-F5344CB8AC3E}">
-        <p14:creationId xmlns:p14="http://schemas.microsoft.com/office/powerpoint/2010/main" val="815354917"/>
+        <p14:creationId xmlns:p14="http://schemas.microsoft.com/office/powerpoint/2010/main" val="3144717354"/>
       </p:ext>
     </p:extLst>
   </p:cSld>
@@ -8509,10 +8565,10 @@
       </p:grpSpPr>
       <p:sp>
         <p:nvSpPr>
-          <p:cNvPr id="2" name="TextBox 1">
-            <a:extLst>
-              <a:ext uri="{FF2B5EF4-FFF2-40B4-BE49-F238E27FC236}">
-                <a16:creationId xmlns:a16="http://schemas.microsoft.com/office/drawing/2014/main" id="{B38BCC31-FC29-6CC1-D49F-BBA1821E7F5D}"/>
+          <p:cNvPr id="5" name="TextBox 4">
+            <a:extLst>
+              <a:ext uri="{FF2B5EF4-FFF2-40B4-BE49-F238E27FC236}">
+                <a16:creationId xmlns:a16="http://schemas.microsoft.com/office/drawing/2014/main" id="{51F1D5CB-D6F5-A25C-1E2E-8EF9011443B5}"/>
               </a:ext>
             </a:extLst>
           </p:cNvPr>
@@ -8521,64 +8577,7 @@
         </p:nvSpPr>
         <p:spPr>
           <a:xfrm>
-            <a:off x="249381" y="138545"/>
-            <a:ext cx="11693237" cy="369332"/>
-          </a:xfrm>
-          <a:prstGeom prst="rect">
-            <a:avLst/>
-          </a:prstGeom>
-          <a:noFill/>
-        </p:spPr>
-        <p:txBody>
-          <a:bodyPr wrap="square" rtlCol="0">
-            <a:spAutoFit/>
-          </a:bodyPr>
-          <a:lstStyle/>
-          <a:p>
-            <a:pPr algn="ctr"/>
-            <a:r>
-              <a:rPr lang="en-US" dirty="0">
-                <a:solidFill>
-                  <a:srgbClr val="FF0000"/>
-                </a:solidFill>
-                <a:highlight>
-                  <a:srgbClr val="FFFF00"/>
-                </a:highlight>
-                <a:latin typeface="Fira Code" panose="020B0809050000020004" pitchFamily="49" charset="0"/>
-                <a:ea typeface="Fira Code" panose="020B0809050000020004" pitchFamily="49" charset="0"/>
-                <a:cs typeface="Fira Code" panose="020B0809050000020004" pitchFamily="49" charset="0"/>
-              </a:rPr>
-              <a:t>Let’s now explore the steps of using Redux with React to manage the state Globally.</a:t>
-            </a:r>
-            <a:endParaRPr lang="en-IN" dirty="0">
-              <a:solidFill>
-                <a:srgbClr val="FF0000"/>
-              </a:solidFill>
-              <a:highlight>
-                <a:srgbClr val="FFFF00"/>
-              </a:highlight>
-              <a:latin typeface="Fira Code" panose="020B0809050000020004" pitchFamily="49" charset="0"/>
-              <a:ea typeface="Fira Code" panose="020B0809050000020004" pitchFamily="49" charset="0"/>
-              <a:cs typeface="Fira Code" panose="020B0809050000020004" pitchFamily="49" charset="0"/>
-            </a:endParaRPr>
-          </a:p>
-        </p:txBody>
-      </p:sp>
-      <p:sp>
-        <p:nvSpPr>
-          <p:cNvPr id="3" name="TextBox 2">
-            <a:extLst>
-              <a:ext uri="{FF2B5EF4-FFF2-40B4-BE49-F238E27FC236}">
-                <a16:creationId xmlns:a16="http://schemas.microsoft.com/office/drawing/2014/main" id="{1F8F28B6-1C66-C1C4-4441-0C343C38D5C6}"/>
-              </a:ext>
-            </a:extLst>
-          </p:cNvPr>
-          <p:cNvSpPr txBox="1"/>
-          <p:nvPr/>
-        </p:nvSpPr>
-        <p:spPr>
-          <a:xfrm>
-            <a:off x="1371600" y="679747"/>
+            <a:off x="1371600" y="138545"/>
             <a:ext cx="8506691" cy="523220"/>
           </a:xfrm>
           <a:prstGeom prst="rect">
@@ -8790,10 +8789,10 @@
       </p:sp>
       <p:sp>
         <p:nvSpPr>
-          <p:cNvPr id="4" name="TextBox 3">
-            <a:extLst>
-              <a:ext uri="{FF2B5EF4-FFF2-40B4-BE49-F238E27FC236}">
-                <a16:creationId xmlns:a16="http://schemas.microsoft.com/office/drawing/2014/main" id="{C2ED5EC5-190C-4E20-BFA6-4B7C75370A0C}"/>
+          <p:cNvPr id="6" name="TextBox 5">
+            <a:extLst>
+              <a:ext uri="{FF2B5EF4-FFF2-40B4-BE49-F238E27FC236}">
+                <a16:creationId xmlns:a16="http://schemas.microsoft.com/office/drawing/2014/main" id="{94CF6B2D-1361-7E34-5E09-A268EE937C9D}"/>
               </a:ext>
             </a:extLst>
           </p:cNvPr>
@@ -8802,8 +8801,8 @@
         </p:nvSpPr>
         <p:spPr>
           <a:xfrm>
-            <a:off x="374072" y="1374837"/>
-            <a:ext cx="11568546" cy="369332"/>
+            <a:off x="374072" y="774304"/>
+            <a:ext cx="11568546" cy="646331"/>
           </a:xfrm>
           <a:prstGeom prst="rect">
             <a:avLst/>
@@ -8827,19 +8826,18 @@
                 <a:ea typeface="Fira Code" panose="020B0809050000020004" pitchFamily="49" charset="0"/>
                 <a:cs typeface="Fira Code" panose="020B0809050000020004" pitchFamily="49" charset="0"/>
               </a:rPr>
-              <a:t>Providing the store to the ancestor component </a:t>
-            </a:r>
-            <a:r>
-              <a:rPr lang="en-US" b="1" dirty="0">
+              <a:t>Creating the Reducer: </a:t>
+            </a:r>
+            <a:r>
+              <a:rPr lang="en-US" dirty="0">
                 <a:solidFill>
                   <a:schemeClr val="bg1"/>
                 </a:solidFill>
                 <a:latin typeface="Fira Code" panose="020B0809050000020004" pitchFamily="49" charset="0"/>
                 <a:ea typeface="Fira Code" panose="020B0809050000020004" pitchFamily="49" charset="0"/>
                 <a:cs typeface="Fira Code" panose="020B0809050000020004" pitchFamily="49" charset="0"/>
-                <a:sym typeface="Wingdings" panose="05000000000000000000" pitchFamily="2" charset="2"/>
-              </a:rPr>
-              <a:t>   </a:t>
+              </a:rPr>
+              <a:t>Reducers are the functions that take the current state and an action as arguments, and return new state as result</a:t>
             </a:r>
             <a:endParaRPr lang="en-IN" dirty="0">
               <a:solidFill>
@@ -8854,10 +8852,10 @@
       </p:sp>
       <p:sp>
         <p:nvSpPr>
-          <p:cNvPr id="5" name="TextBox 4">
-            <a:extLst>
-              <a:ext uri="{FF2B5EF4-FFF2-40B4-BE49-F238E27FC236}">
-                <a16:creationId xmlns:a16="http://schemas.microsoft.com/office/drawing/2014/main" id="{6E76E0B2-330B-398F-C995-137DB7510EE7}"/>
+          <p:cNvPr id="7" name="TextBox 6">
+            <a:extLst>
+              <a:ext uri="{FF2B5EF4-FFF2-40B4-BE49-F238E27FC236}">
+                <a16:creationId xmlns:a16="http://schemas.microsoft.com/office/drawing/2014/main" id="{7836D786-09E5-5038-201D-735A1A6071B1}"/>
               </a:ext>
             </a:extLst>
           </p:cNvPr>
@@ -8866,8 +8864,8 @@
         </p:nvSpPr>
         <p:spPr>
           <a:xfrm>
-            <a:off x="568036" y="2382982"/>
-            <a:ext cx="11139055" cy="4154984"/>
+            <a:off x="606136" y="1574524"/>
+            <a:ext cx="11083636" cy="2554545"/>
           </a:xfrm>
           <a:prstGeom prst="rect">
             <a:avLst/>
@@ -8883,104 +8881,236 @@
           <a:lstStyle/>
           <a:p>
             <a:r>
-              <a:rPr lang="en-IN" sz="2400" b="1" dirty="0">
+              <a:rPr lang="en-US" sz="2000" b="1" dirty="0">
                 <a:latin typeface="Fira Code" panose="020B0809050000020004" pitchFamily="49" charset="0"/>
                 <a:ea typeface="Fira Code" panose="020B0809050000020004" pitchFamily="49" charset="0"/>
                 <a:cs typeface="Fira Code" panose="020B0809050000020004" pitchFamily="49" charset="0"/>
               </a:rPr>
-              <a:t>import store from ‘path of the store.js file’;</a:t>
-            </a:r>
-          </a:p>
-          <a:p>
-            <a:r>
-              <a:rPr lang="en-IN" sz="2400" b="1" dirty="0">
+              <a:t>const inititalState = 0</a:t>
+            </a:r>
+          </a:p>
+          <a:p>
+            <a:r>
+              <a:rPr lang="en-US" sz="2000" b="1" dirty="0">
                 <a:latin typeface="Fira Code" panose="020B0809050000020004" pitchFamily="49" charset="0"/>
                 <a:ea typeface="Fira Code" panose="020B0809050000020004" pitchFamily="49" charset="0"/>
                 <a:cs typeface="Fira Code" panose="020B0809050000020004" pitchFamily="49" charset="0"/>
               </a:rPr>
-              <a:t>import { Provider } from 'react-redux’;</a:t>
-            </a:r>
-          </a:p>
-          <a:p>
-            <a:endParaRPr lang="en-IN" sz="2400" b="1" dirty="0">
+              <a:t>const changeTheNumber = (state = initialState, action) =&gt; {</a:t>
+            </a:r>
+          </a:p>
+          <a:p>
+            <a:r>
+              <a:rPr lang="en-US" sz="2000" b="1" dirty="0">
+                <a:latin typeface="Fira Code" panose="020B0809050000020004" pitchFamily="49" charset="0"/>
+                <a:ea typeface="Fira Code" panose="020B0809050000020004" pitchFamily="49" charset="0"/>
+                <a:cs typeface="Fira Code" panose="020B0809050000020004" pitchFamily="49" charset="0"/>
+              </a:rPr>
+              <a:t>	switch (action.type) {</a:t>
+            </a:r>
+          </a:p>
+          <a:p>
+            <a:r>
+              <a:rPr lang="en-US" sz="2000" b="1" dirty="0">
+                <a:latin typeface="Fira Code" panose="020B0809050000020004" pitchFamily="49" charset="0"/>
+                <a:ea typeface="Fira Code" panose="020B0809050000020004" pitchFamily="49" charset="0"/>
+                <a:cs typeface="Fira Code" panose="020B0809050000020004" pitchFamily="49" charset="0"/>
+              </a:rPr>
+              <a:t>	    case “INCREMENT”: return state + action.payload;</a:t>
+            </a:r>
+          </a:p>
+          <a:p>
+            <a:r>
+              <a:rPr lang="en-US" sz="2000" b="1" dirty="0">
+                <a:latin typeface="Fira Code" panose="020B0809050000020004" pitchFamily="49" charset="0"/>
+                <a:ea typeface="Fira Code" panose="020B0809050000020004" pitchFamily="49" charset="0"/>
+                <a:cs typeface="Fira Code" panose="020B0809050000020004" pitchFamily="49" charset="0"/>
+              </a:rPr>
+              <a:t>	    case “DECREMENT”: return state – 1;</a:t>
+            </a:r>
+          </a:p>
+          <a:p>
+            <a:r>
+              <a:rPr lang="en-US" sz="2000" b="1" dirty="0">
+                <a:latin typeface="Fira Code" panose="020B0809050000020004" pitchFamily="49" charset="0"/>
+                <a:ea typeface="Fira Code" panose="020B0809050000020004" pitchFamily="49" charset="0"/>
+                <a:cs typeface="Fira Code" panose="020B0809050000020004" pitchFamily="49" charset="0"/>
+              </a:rPr>
+              <a:t>	    default: return state;</a:t>
+            </a:r>
+          </a:p>
+          <a:p>
+            <a:r>
+              <a:rPr lang="en-US" sz="2000" b="1" dirty="0">
+                <a:latin typeface="Fira Code" panose="020B0809050000020004" pitchFamily="49" charset="0"/>
+                <a:ea typeface="Fira Code" panose="020B0809050000020004" pitchFamily="49" charset="0"/>
+                <a:cs typeface="Fira Code" panose="020B0809050000020004" pitchFamily="49" charset="0"/>
+              </a:rPr>
+              <a:t>    }</a:t>
+            </a:r>
+          </a:p>
+          <a:p>
+            <a:r>
+              <a:rPr lang="en-US" sz="2000" b="1" dirty="0">
+                <a:latin typeface="Fira Code" panose="020B0809050000020004" pitchFamily="49" charset="0"/>
+                <a:ea typeface="Fira Code" panose="020B0809050000020004" pitchFamily="49" charset="0"/>
+                <a:cs typeface="Fira Code" panose="020B0809050000020004" pitchFamily="49" charset="0"/>
+              </a:rPr>
+              <a:t>} </a:t>
+            </a:r>
+            <a:endParaRPr lang="en-IN" sz="2000" b="1" dirty="0">
               <a:latin typeface="Fira Code" panose="020B0809050000020004" pitchFamily="49" charset="0"/>
               <a:ea typeface="Fira Code" panose="020B0809050000020004" pitchFamily="49" charset="0"/>
               <a:cs typeface="Fira Code" panose="020B0809050000020004" pitchFamily="49" charset="0"/>
             </a:endParaRPr>
           </a:p>
-          <a:p>
-            <a:r>
-              <a:rPr lang="en-IN" sz="2400" b="1" dirty="0">
+        </p:txBody>
+      </p:sp>
+      <p:sp>
+        <p:nvSpPr>
+          <p:cNvPr id="8" name="TextBox 7">
+            <a:extLst>
+              <a:ext uri="{FF2B5EF4-FFF2-40B4-BE49-F238E27FC236}">
+                <a16:creationId xmlns:a16="http://schemas.microsoft.com/office/drawing/2014/main" id="{21507469-CD4F-AA25-A718-FA025B1BFD7B}"/>
+              </a:ext>
+            </a:extLst>
+          </p:cNvPr>
+          <p:cNvSpPr txBox="1"/>
+          <p:nvPr/>
+        </p:nvSpPr>
+        <p:spPr>
+          <a:xfrm>
+            <a:off x="606136" y="4282958"/>
+            <a:ext cx="11083636" cy="646331"/>
+          </a:xfrm>
+          <a:prstGeom prst="rect">
+            <a:avLst/>
+          </a:prstGeom>
+          <a:solidFill>
+            <a:schemeClr val="tx1"/>
+          </a:solidFill>
+        </p:spPr>
+        <p:txBody>
+          <a:bodyPr wrap="square" rtlCol="0">
+            <a:spAutoFit/>
+          </a:bodyPr>
+          <a:lstStyle/>
+          <a:p>
+            <a:r>
+              <a:rPr lang="en-US" dirty="0">
+                <a:solidFill>
+                  <a:schemeClr val="bg1"/>
+                </a:solidFill>
+              </a:rPr>
+              <a:t>If we have more than one reducer then we can combine all the reducers to the rootReducer. For this we need a function combineReducers (which we have to import from “redux library”). Now let’s have a look on how to do it </a:t>
+            </a:r>
+            <a:r>
+              <a:rPr lang="en-US" dirty="0">
+                <a:solidFill>
+                  <a:schemeClr val="bg1"/>
+                </a:solidFill>
+                <a:sym typeface="Wingdings" panose="05000000000000000000" pitchFamily="2" charset="2"/>
+              </a:rPr>
+              <a:t></a:t>
+            </a:r>
+            <a:endParaRPr lang="en-IN" dirty="0">
+              <a:solidFill>
+                <a:schemeClr val="bg1"/>
+              </a:solidFill>
+            </a:endParaRPr>
+          </a:p>
+        </p:txBody>
+      </p:sp>
+      <p:sp>
+        <p:nvSpPr>
+          <p:cNvPr id="2" name="TextBox 1">
+            <a:extLst>
+              <a:ext uri="{FF2B5EF4-FFF2-40B4-BE49-F238E27FC236}">
+                <a16:creationId xmlns:a16="http://schemas.microsoft.com/office/drawing/2014/main" id="{C98CA44B-45F2-D780-48A8-C06D71D13918}"/>
+              </a:ext>
+            </a:extLst>
+          </p:cNvPr>
+          <p:cNvSpPr txBox="1"/>
+          <p:nvPr/>
+        </p:nvSpPr>
+        <p:spPr>
+          <a:xfrm>
+            <a:off x="554181" y="5083178"/>
+            <a:ext cx="11187546" cy="1631216"/>
+          </a:xfrm>
+          <a:prstGeom prst="rect">
+            <a:avLst/>
+          </a:prstGeom>
+          <a:solidFill>
+            <a:srgbClr val="92D050"/>
+          </a:solidFill>
+        </p:spPr>
+        <p:txBody>
+          <a:bodyPr wrap="square" rtlCol="0">
+            <a:spAutoFit/>
+          </a:bodyPr>
+          <a:lstStyle/>
+          <a:p>
+            <a:r>
+              <a:rPr lang="en-US" sz="2000" b="1" dirty="0">
                 <a:latin typeface="Fira Code" panose="020B0809050000020004" pitchFamily="49" charset="0"/>
                 <a:ea typeface="Fira Code" panose="020B0809050000020004" pitchFamily="49" charset="0"/>
                 <a:cs typeface="Fira Code" panose="020B0809050000020004" pitchFamily="49" charset="0"/>
               </a:rPr>
-              <a:t>const root = ReactDOM.createRoot(document.getElementById('root'))</a:t>
-            </a:r>
-          </a:p>
-          <a:p>
-            <a:endParaRPr lang="en-IN" sz="2400" b="1" dirty="0">
+              <a:t> import { combineReducers } form “redux”;</a:t>
+            </a:r>
+          </a:p>
+          <a:p>
+            <a:r>
+              <a:rPr lang="en-US" sz="2000" b="1" dirty="0">
+                <a:latin typeface="Fira Code" panose="020B0809050000020004" pitchFamily="49" charset="0"/>
+                <a:ea typeface="Fira Code" panose="020B0809050000020004" pitchFamily="49" charset="0"/>
+                <a:cs typeface="Fira Code" panose="020B0809050000020004" pitchFamily="49" charset="0"/>
+              </a:rPr>
+              <a:t> const rootReducer = combineReducers({</a:t>
+            </a:r>
+          </a:p>
+          <a:p>
+            <a:r>
+              <a:rPr lang="en-US" sz="2000" b="1" dirty="0">
+                <a:latin typeface="Fira Code" panose="020B0809050000020004" pitchFamily="49" charset="0"/>
+                <a:ea typeface="Fira Code" panose="020B0809050000020004" pitchFamily="49" charset="0"/>
+                <a:cs typeface="Fira Code" panose="020B0809050000020004" pitchFamily="49" charset="0"/>
+              </a:rPr>
+              <a:t> changeTheNumber, second reducer if we have any and so on</a:t>
+            </a:r>
+          </a:p>
+          <a:p>
+            <a:r>
+              <a:rPr lang="en-US" sz="2000" b="1" dirty="0">
+                <a:latin typeface="Fira Code" panose="020B0809050000020004" pitchFamily="49" charset="0"/>
+                <a:ea typeface="Fira Code" panose="020B0809050000020004" pitchFamily="49" charset="0"/>
+                <a:cs typeface="Fira Code" panose="020B0809050000020004" pitchFamily="49" charset="0"/>
+              </a:rPr>
+              <a:t>})</a:t>
+            </a:r>
+          </a:p>
+          <a:p>
+            <a:r>
+              <a:rPr lang="en-US" sz="2000" b="1" dirty="0">
+                <a:latin typeface="Fira Code" panose="020B0809050000020004" pitchFamily="49" charset="0"/>
+                <a:ea typeface="Fira Code" panose="020B0809050000020004" pitchFamily="49" charset="0"/>
+                <a:cs typeface="Fira Code" panose="020B0809050000020004" pitchFamily="49" charset="0"/>
+              </a:rPr>
+              <a:t>export default rootReducer</a:t>
+            </a:r>
+            <a:endParaRPr lang="en-IN" sz="2000" b="1" dirty="0">
               <a:latin typeface="Fira Code" panose="020B0809050000020004" pitchFamily="49" charset="0"/>
               <a:ea typeface="Fira Code" panose="020B0809050000020004" pitchFamily="49" charset="0"/>
               <a:cs typeface="Fira Code" panose="020B0809050000020004" pitchFamily="49" charset="0"/>
             </a:endParaRPr>
           </a:p>
-          <a:p>
-            <a:r>
-              <a:rPr lang="en-IN" sz="2400" b="1" dirty="0">
-                <a:latin typeface="Fira Code" panose="020B0809050000020004" pitchFamily="49" charset="0"/>
-                <a:ea typeface="Fira Code" panose="020B0809050000020004" pitchFamily="49" charset="0"/>
-                <a:cs typeface="Fira Code" panose="020B0809050000020004" pitchFamily="49" charset="0"/>
-              </a:rPr>
-              <a:t>root.render(</a:t>
-            </a:r>
-          </a:p>
-          <a:p>
-            <a:r>
-              <a:rPr lang="en-IN" sz="2400" b="1" dirty="0">
-                <a:latin typeface="Fira Code" panose="020B0809050000020004" pitchFamily="49" charset="0"/>
-                <a:ea typeface="Fira Code" panose="020B0809050000020004" pitchFamily="49" charset="0"/>
-                <a:cs typeface="Fira Code" panose="020B0809050000020004" pitchFamily="49" charset="0"/>
-              </a:rPr>
-              <a:t>  &lt;Provider store={store}&gt;</a:t>
-            </a:r>
-          </a:p>
-          <a:p>
-            <a:r>
-              <a:rPr lang="en-IN" sz="2400" b="1" dirty="0">
-                <a:latin typeface="Fira Code" panose="020B0809050000020004" pitchFamily="49" charset="0"/>
-                <a:ea typeface="Fira Code" panose="020B0809050000020004" pitchFamily="49" charset="0"/>
-                <a:cs typeface="Fira Code" panose="020B0809050000020004" pitchFamily="49" charset="0"/>
-              </a:rPr>
-              <a:t>    &lt;App /&gt;</a:t>
-            </a:r>
-          </a:p>
-          <a:p>
-            <a:r>
-              <a:rPr lang="en-IN" sz="2400" b="1" dirty="0">
-                <a:latin typeface="Fira Code" panose="020B0809050000020004" pitchFamily="49" charset="0"/>
-                <a:ea typeface="Fira Code" panose="020B0809050000020004" pitchFamily="49" charset="0"/>
-                <a:cs typeface="Fira Code" panose="020B0809050000020004" pitchFamily="49" charset="0"/>
-              </a:rPr>
-              <a:t>  &lt;/Provider&gt;</a:t>
-            </a:r>
-          </a:p>
-          <a:p>
-            <a:r>
-              <a:rPr lang="en-IN" sz="2400" b="1" dirty="0">
-                <a:latin typeface="Fira Code" panose="020B0809050000020004" pitchFamily="49" charset="0"/>
-                <a:ea typeface="Fira Code" panose="020B0809050000020004" pitchFamily="49" charset="0"/>
-                <a:cs typeface="Fira Code" panose="020B0809050000020004" pitchFamily="49" charset="0"/>
-              </a:rPr>
-              <a:t>)</a:t>
-            </a:r>
-          </a:p>
         </p:txBody>
       </p:sp>
     </p:spTree>
     <p:extLst>
       <p:ext uri="{BB962C8B-B14F-4D97-AF65-F5344CB8AC3E}">
-        <p14:creationId xmlns:p14="http://schemas.microsoft.com/office/powerpoint/2010/main" val="419728732"/>
+        <p14:creationId xmlns:p14="http://schemas.microsoft.com/office/powerpoint/2010/main" val="815354917"/>
       </p:ext>
     </p:extLst>
   </p:cSld>
@@ -9009,10 +9139,10 @@
       </p:grpSpPr>
       <p:sp>
         <p:nvSpPr>
-          <p:cNvPr id="4" name="TextBox 3">
-            <a:extLst>
-              <a:ext uri="{FF2B5EF4-FFF2-40B4-BE49-F238E27FC236}">
-                <a16:creationId xmlns:a16="http://schemas.microsoft.com/office/drawing/2014/main" id="{F3F9EC10-9FA7-7BAD-03A6-E2D13035CCBC}"/>
+          <p:cNvPr id="3" name="TextBox 2">
+            <a:extLst>
+              <a:ext uri="{FF2B5EF4-FFF2-40B4-BE49-F238E27FC236}">
+                <a16:creationId xmlns:a16="http://schemas.microsoft.com/office/drawing/2014/main" id="{1F8F28B6-1C66-C1C4-4441-0C343C38D5C6}"/>
               </a:ext>
             </a:extLst>
           </p:cNvPr>
@@ -9021,64 +9151,7 @@
         </p:nvSpPr>
         <p:spPr>
           <a:xfrm>
-            <a:off x="249381" y="138545"/>
-            <a:ext cx="11693237" cy="369332"/>
-          </a:xfrm>
-          <a:prstGeom prst="rect">
-            <a:avLst/>
-          </a:prstGeom>
-          <a:noFill/>
-        </p:spPr>
-        <p:txBody>
-          <a:bodyPr wrap="square" rtlCol="0">
-            <a:spAutoFit/>
-          </a:bodyPr>
-          <a:lstStyle/>
-          <a:p>
-            <a:pPr algn="ctr"/>
-            <a:r>
-              <a:rPr lang="en-US" dirty="0">
-                <a:solidFill>
-                  <a:srgbClr val="FF0000"/>
-                </a:solidFill>
-                <a:highlight>
-                  <a:srgbClr val="FFFF00"/>
-                </a:highlight>
-                <a:latin typeface="Fira Code" panose="020B0809050000020004" pitchFamily="49" charset="0"/>
-                <a:ea typeface="Fira Code" panose="020B0809050000020004" pitchFamily="49" charset="0"/>
-                <a:cs typeface="Fira Code" panose="020B0809050000020004" pitchFamily="49" charset="0"/>
-              </a:rPr>
-              <a:t>Let’s now explore the steps of using Redux with React to manage the state Globally.</a:t>
-            </a:r>
-            <a:endParaRPr lang="en-IN" dirty="0">
-              <a:solidFill>
-                <a:srgbClr val="FF0000"/>
-              </a:solidFill>
-              <a:highlight>
-                <a:srgbClr val="FFFF00"/>
-              </a:highlight>
-              <a:latin typeface="Fira Code" panose="020B0809050000020004" pitchFamily="49" charset="0"/>
-              <a:ea typeface="Fira Code" panose="020B0809050000020004" pitchFamily="49" charset="0"/>
-              <a:cs typeface="Fira Code" panose="020B0809050000020004" pitchFamily="49" charset="0"/>
-            </a:endParaRPr>
-          </a:p>
-        </p:txBody>
-      </p:sp>
-      <p:sp>
-        <p:nvSpPr>
-          <p:cNvPr id="5" name="TextBox 4">
-            <a:extLst>
-              <a:ext uri="{FF2B5EF4-FFF2-40B4-BE49-F238E27FC236}">
-                <a16:creationId xmlns:a16="http://schemas.microsoft.com/office/drawing/2014/main" id="{36185A12-0722-FDA1-088A-D216F4E7D45C}"/>
-              </a:ext>
-            </a:extLst>
-          </p:cNvPr>
-          <p:cNvSpPr txBox="1"/>
-          <p:nvPr/>
-        </p:nvSpPr>
-        <p:spPr>
-          <a:xfrm>
-            <a:off x="1371600" y="679747"/>
+            <a:off x="1343891" y="212804"/>
             <a:ext cx="8506691" cy="523220"/>
           </a:xfrm>
           <a:prstGeom prst="rect">
@@ -9290,10 +9363,10 @@
       </p:sp>
       <p:sp>
         <p:nvSpPr>
-          <p:cNvPr id="6" name="TextBox 5">
-            <a:extLst>
-              <a:ext uri="{FF2B5EF4-FFF2-40B4-BE49-F238E27FC236}">
-                <a16:creationId xmlns:a16="http://schemas.microsoft.com/office/drawing/2014/main" id="{997DD09D-F8F7-8B40-6A46-D1007240C2C0}"/>
+          <p:cNvPr id="4" name="TextBox 3">
+            <a:extLst>
+              <a:ext uri="{FF2B5EF4-FFF2-40B4-BE49-F238E27FC236}">
+                <a16:creationId xmlns:a16="http://schemas.microsoft.com/office/drawing/2014/main" id="{C2ED5EC5-190C-4E20-BFA6-4B7C75370A0C}"/>
               </a:ext>
             </a:extLst>
           </p:cNvPr>
@@ -9302,8 +9375,8 @@
         </p:nvSpPr>
         <p:spPr>
           <a:xfrm>
-            <a:off x="374072" y="1374837"/>
-            <a:ext cx="11568546" cy="1754326"/>
+            <a:off x="353290" y="903783"/>
+            <a:ext cx="11568546" cy="369332"/>
           </a:xfrm>
           <a:prstGeom prst="rect">
             <a:avLst/>
@@ -9327,7 +9400,19 @@
                 <a:ea typeface="Fira Code" panose="020B0809050000020004" pitchFamily="49" charset="0"/>
                 <a:cs typeface="Fira Code" panose="020B0809050000020004" pitchFamily="49" charset="0"/>
               </a:rPr>
-              <a:t>Importing useSelector and useDispatch hook : useSelector hook is used to access the data from redux store and useDispatch hook is used to dispatch the action which will change the state. (whenever a action is dispatched by the useDispatch hook, reducer receives the type of that action and then depending upon the type of the action it changes the state based on our given condition and updates the latest state inside the store)</a:t>
+              <a:t>Providing the store to the ancestor component </a:t>
+            </a:r>
+            <a:r>
+              <a:rPr lang="en-US" b="1" dirty="0">
+                <a:solidFill>
+                  <a:schemeClr val="bg1"/>
+                </a:solidFill>
+                <a:latin typeface="Fira Code" panose="020B0809050000020004" pitchFamily="49" charset="0"/>
+                <a:ea typeface="Fira Code" panose="020B0809050000020004" pitchFamily="49" charset="0"/>
+                <a:cs typeface="Fira Code" panose="020B0809050000020004" pitchFamily="49" charset="0"/>
+                <a:sym typeface="Wingdings" panose="05000000000000000000" pitchFamily="2" charset="2"/>
+              </a:rPr>
+              <a:t>   </a:t>
             </a:r>
             <a:endParaRPr lang="en-IN" dirty="0">
               <a:solidFill>
@@ -9342,10 +9427,10 @@
       </p:sp>
       <p:sp>
         <p:nvSpPr>
-          <p:cNvPr id="7" name="TextBox 6">
-            <a:extLst>
-              <a:ext uri="{FF2B5EF4-FFF2-40B4-BE49-F238E27FC236}">
-                <a16:creationId xmlns:a16="http://schemas.microsoft.com/office/drawing/2014/main" id="{4A5EBA0F-B248-3DD1-F909-AAF5D7404ADC}"/>
+          <p:cNvPr id="5" name="TextBox 4">
+            <a:extLst>
+              <a:ext uri="{FF2B5EF4-FFF2-40B4-BE49-F238E27FC236}">
+                <a16:creationId xmlns:a16="http://schemas.microsoft.com/office/drawing/2014/main" id="{6E76E0B2-330B-398F-C995-137DB7510EE7}"/>
               </a:ext>
             </a:extLst>
           </p:cNvPr>
@@ -9354,7 +9439,438 @@
         </p:nvSpPr>
         <p:spPr>
           <a:xfrm>
-            <a:off x="76199" y="3435927"/>
+            <a:off x="526472" y="1593273"/>
+            <a:ext cx="11139055" cy="4154984"/>
+          </a:xfrm>
+          <a:prstGeom prst="rect">
+            <a:avLst/>
+          </a:prstGeom>
+          <a:solidFill>
+            <a:srgbClr val="92D050"/>
+          </a:solidFill>
+        </p:spPr>
+        <p:txBody>
+          <a:bodyPr wrap="square" rtlCol="0">
+            <a:spAutoFit/>
+          </a:bodyPr>
+          <a:lstStyle/>
+          <a:p>
+            <a:r>
+              <a:rPr lang="en-IN" sz="2400" b="1" dirty="0">
+                <a:latin typeface="Fira Code" panose="020B0809050000020004" pitchFamily="49" charset="0"/>
+                <a:ea typeface="Fira Code" panose="020B0809050000020004" pitchFamily="49" charset="0"/>
+                <a:cs typeface="Fira Code" panose="020B0809050000020004" pitchFamily="49" charset="0"/>
+              </a:rPr>
+              <a:t>import store from ‘path of the store.js file’;</a:t>
+            </a:r>
+          </a:p>
+          <a:p>
+            <a:r>
+              <a:rPr lang="en-IN" sz="2400" b="1" dirty="0">
+                <a:latin typeface="Fira Code" panose="020B0809050000020004" pitchFamily="49" charset="0"/>
+                <a:ea typeface="Fira Code" panose="020B0809050000020004" pitchFamily="49" charset="0"/>
+                <a:cs typeface="Fira Code" panose="020B0809050000020004" pitchFamily="49" charset="0"/>
+              </a:rPr>
+              <a:t>import { Provider } from 'react-redux’;</a:t>
+            </a:r>
+          </a:p>
+          <a:p>
+            <a:endParaRPr lang="en-IN" sz="2400" b="1" dirty="0">
+              <a:latin typeface="Fira Code" panose="020B0809050000020004" pitchFamily="49" charset="0"/>
+              <a:ea typeface="Fira Code" panose="020B0809050000020004" pitchFamily="49" charset="0"/>
+              <a:cs typeface="Fira Code" panose="020B0809050000020004" pitchFamily="49" charset="0"/>
+            </a:endParaRPr>
+          </a:p>
+          <a:p>
+            <a:r>
+              <a:rPr lang="en-IN" sz="2400" b="1" dirty="0">
+                <a:latin typeface="Fira Code" panose="020B0809050000020004" pitchFamily="49" charset="0"/>
+                <a:ea typeface="Fira Code" panose="020B0809050000020004" pitchFamily="49" charset="0"/>
+                <a:cs typeface="Fira Code" panose="020B0809050000020004" pitchFamily="49" charset="0"/>
+              </a:rPr>
+              <a:t>const root = ReactDOM.createRoot(document.getElementById('root'))</a:t>
+            </a:r>
+          </a:p>
+          <a:p>
+            <a:endParaRPr lang="en-IN" sz="2400" b="1" dirty="0">
+              <a:latin typeface="Fira Code" panose="020B0809050000020004" pitchFamily="49" charset="0"/>
+              <a:ea typeface="Fira Code" panose="020B0809050000020004" pitchFamily="49" charset="0"/>
+              <a:cs typeface="Fira Code" panose="020B0809050000020004" pitchFamily="49" charset="0"/>
+            </a:endParaRPr>
+          </a:p>
+          <a:p>
+            <a:r>
+              <a:rPr lang="en-IN" sz="2400" b="1" dirty="0">
+                <a:latin typeface="Fira Code" panose="020B0809050000020004" pitchFamily="49" charset="0"/>
+                <a:ea typeface="Fira Code" panose="020B0809050000020004" pitchFamily="49" charset="0"/>
+                <a:cs typeface="Fira Code" panose="020B0809050000020004" pitchFamily="49" charset="0"/>
+              </a:rPr>
+              <a:t>root.render(</a:t>
+            </a:r>
+          </a:p>
+          <a:p>
+            <a:r>
+              <a:rPr lang="en-IN" sz="2400" b="1" dirty="0">
+                <a:latin typeface="Fira Code" panose="020B0809050000020004" pitchFamily="49" charset="0"/>
+                <a:ea typeface="Fira Code" panose="020B0809050000020004" pitchFamily="49" charset="0"/>
+                <a:cs typeface="Fira Code" panose="020B0809050000020004" pitchFamily="49" charset="0"/>
+              </a:rPr>
+              <a:t>  &lt;Provider store={store}&gt;</a:t>
+            </a:r>
+          </a:p>
+          <a:p>
+            <a:r>
+              <a:rPr lang="en-IN" sz="2400" b="1" dirty="0">
+                <a:latin typeface="Fira Code" panose="020B0809050000020004" pitchFamily="49" charset="0"/>
+                <a:ea typeface="Fira Code" panose="020B0809050000020004" pitchFamily="49" charset="0"/>
+                <a:cs typeface="Fira Code" panose="020B0809050000020004" pitchFamily="49" charset="0"/>
+              </a:rPr>
+              <a:t>    &lt;App /&gt;</a:t>
+            </a:r>
+          </a:p>
+          <a:p>
+            <a:r>
+              <a:rPr lang="en-IN" sz="2400" b="1" dirty="0">
+                <a:latin typeface="Fira Code" panose="020B0809050000020004" pitchFamily="49" charset="0"/>
+                <a:ea typeface="Fira Code" panose="020B0809050000020004" pitchFamily="49" charset="0"/>
+                <a:cs typeface="Fira Code" panose="020B0809050000020004" pitchFamily="49" charset="0"/>
+              </a:rPr>
+              <a:t>  &lt;/Provider&gt;</a:t>
+            </a:r>
+          </a:p>
+          <a:p>
+            <a:r>
+              <a:rPr lang="en-IN" sz="2400" b="1" dirty="0">
+                <a:latin typeface="Fira Code" panose="020B0809050000020004" pitchFamily="49" charset="0"/>
+                <a:ea typeface="Fira Code" panose="020B0809050000020004" pitchFamily="49" charset="0"/>
+                <a:cs typeface="Fira Code" panose="020B0809050000020004" pitchFamily="49" charset="0"/>
+              </a:rPr>
+              <a:t>)</a:t>
+            </a:r>
+          </a:p>
+        </p:txBody>
+      </p:sp>
+    </p:spTree>
+    <p:extLst>
+      <p:ext uri="{BB962C8B-B14F-4D97-AF65-F5344CB8AC3E}">
+        <p14:creationId xmlns:p14="http://schemas.microsoft.com/office/powerpoint/2010/main" val="419728732"/>
+      </p:ext>
+    </p:extLst>
+  </p:cSld>
+  <p:clrMapOvr>
+    <a:masterClrMapping/>
+  </p:clrMapOvr>
+</p:sld>
+</file>
+
+<file path=ppt/slides/slide8.xml><?xml version="1.0" encoding="utf-8"?>
+<p:sld xmlns:a="http://schemas.openxmlformats.org/drawingml/2006/main" xmlns:r="http://schemas.openxmlformats.org/officeDocument/2006/relationships" xmlns:p="http://schemas.openxmlformats.org/presentationml/2006/main">
+  <p:cSld>
+    <p:spTree>
+      <p:nvGrpSpPr>
+        <p:cNvPr id="1" name=""/>
+        <p:cNvGrpSpPr/>
+        <p:nvPr/>
+      </p:nvGrpSpPr>
+      <p:grpSpPr>
+        <a:xfrm>
+          <a:off x="0" y="0"/>
+          <a:ext cx="0" cy="0"/>
+          <a:chOff x="0" y="0"/>
+          <a:chExt cx="0" cy="0"/>
+        </a:xfrm>
+      </p:grpSpPr>
+      <p:sp>
+        <p:nvSpPr>
+          <p:cNvPr id="5" name="TextBox 4">
+            <a:extLst>
+              <a:ext uri="{FF2B5EF4-FFF2-40B4-BE49-F238E27FC236}">
+                <a16:creationId xmlns:a16="http://schemas.microsoft.com/office/drawing/2014/main" id="{36185A12-0722-FDA1-088A-D216F4E7D45C}"/>
+              </a:ext>
+            </a:extLst>
+          </p:cNvPr>
+          <p:cNvSpPr txBox="1"/>
+          <p:nvPr/>
+        </p:nvSpPr>
+        <p:spPr>
+          <a:xfrm>
+            <a:off x="1413164" y="113475"/>
+            <a:ext cx="8506691" cy="523220"/>
+          </a:xfrm>
+          <a:prstGeom prst="rect">
+            <a:avLst/>
+          </a:prstGeom>
+          <a:noFill/>
+        </p:spPr>
+        <p:txBody>
+          <a:bodyPr wrap="square" rtlCol="0">
+            <a:spAutoFit/>
+          </a:bodyPr>
+          <a:lstStyle/>
+          <a:p>
+            <a:pPr algn="ctr"/>
+            <a:r>
+              <a:rPr lang="en-US" sz="2800" dirty="0">
+                <a:solidFill>
+                  <a:srgbClr val="FF0000"/>
+                </a:solidFill>
+                <a:highlight>
+                  <a:srgbClr val="FFFF00"/>
+                </a:highlight>
+              </a:rPr>
+              <a:t>Sixth Step: </a:t>
+            </a:r>
+            <a:r>
+              <a:rPr lang="en-US" sz="2800" dirty="0">
+                <a:solidFill>
+                  <a:srgbClr val="FF0000"/>
+                </a:solidFill>
+                <a:highlight>
+                  <a:srgbClr val="FFFF00"/>
+                </a:highlight>
+                <a:sym typeface="Wingdings" panose="05000000000000000000" pitchFamily="2" charset="2"/>
+              </a:rPr>
+              <a:t></a:t>
+            </a:r>
+            <a:r>
+              <a:rPr lang="en-US" sz="2800" dirty="0">
+                <a:solidFill>
+                  <a:srgbClr val="FF0000"/>
+                </a:solidFill>
+                <a:highlight>
+                  <a:srgbClr val="FFFF00"/>
+                </a:highlight>
+              </a:rPr>
+              <a:t> </a:t>
+            </a:r>
+            <a:r>
+              <a:rPr lang="en-US" sz="2800" dirty="0">
+                <a:solidFill>
+                  <a:srgbClr val="FF0000"/>
+                </a:solidFill>
+                <a:highlight>
+                  <a:srgbClr val="FFFF00"/>
+                </a:highlight>
+                <a:sym typeface="Wingdings" panose="05000000000000000000" pitchFamily="2" charset="2"/>
+              </a:rPr>
+              <a:t></a:t>
+            </a:r>
+            <a:r>
+              <a:rPr lang="en-US" sz="2800" dirty="0">
+                <a:solidFill>
+                  <a:srgbClr val="FF0000"/>
+                </a:solidFill>
+                <a:highlight>
+                  <a:srgbClr val="FFFF00"/>
+                </a:highlight>
+              </a:rPr>
+              <a:t> </a:t>
+            </a:r>
+            <a:r>
+              <a:rPr lang="en-US" sz="2800" dirty="0">
+                <a:solidFill>
+                  <a:srgbClr val="FF0000"/>
+                </a:solidFill>
+                <a:highlight>
+                  <a:srgbClr val="FFFF00"/>
+                </a:highlight>
+                <a:sym typeface="Wingdings" panose="05000000000000000000" pitchFamily="2" charset="2"/>
+              </a:rPr>
+              <a:t></a:t>
+            </a:r>
+            <a:r>
+              <a:rPr lang="en-US" sz="2800" dirty="0">
+                <a:solidFill>
+                  <a:srgbClr val="FF0000"/>
+                </a:solidFill>
+                <a:highlight>
+                  <a:srgbClr val="FFFF00"/>
+                </a:highlight>
+              </a:rPr>
+              <a:t> </a:t>
+            </a:r>
+            <a:r>
+              <a:rPr lang="en-US" sz="2800" dirty="0">
+                <a:solidFill>
+                  <a:srgbClr val="FF0000"/>
+                </a:solidFill>
+                <a:highlight>
+                  <a:srgbClr val="FFFF00"/>
+                </a:highlight>
+                <a:sym typeface="Wingdings" panose="05000000000000000000" pitchFamily="2" charset="2"/>
+              </a:rPr>
+              <a:t></a:t>
+            </a:r>
+            <a:r>
+              <a:rPr lang="en-US" sz="2800" dirty="0">
+                <a:solidFill>
+                  <a:srgbClr val="FF0000"/>
+                </a:solidFill>
+                <a:highlight>
+                  <a:srgbClr val="FFFF00"/>
+                </a:highlight>
+              </a:rPr>
+              <a:t> </a:t>
+            </a:r>
+            <a:r>
+              <a:rPr lang="en-US" sz="2800" dirty="0">
+                <a:solidFill>
+                  <a:srgbClr val="FF0000"/>
+                </a:solidFill>
+                <a:highlight>
+                  <a:srgbClr val="FFFF00"/>
+                </a:highlight>
+                <a:sym typeface="Wingdings" panose="05000000000000000000" pitchFamily="2" charset="2"/>
+              </a:rPr>
+              <a:t></a:t>
+            </a:r>
+            <a:r>
+              <a:rPr lang="en-US" sz="2800" dirty="0">
+                <a:solidFill>
+                  <a:srgbClr val="FF0000"/>
+                </a:solidFill>
+                <a:highlight>
+                  <a:srgbClr val="FFFF00"/>
+                </a:highlight>
+              </a:rPr>
+              <a:t> </a:t>
+            </a:r>
+            <a:r>
+              <a:rPr lang="en-US" sz="2800" dirty="0">
+                <a:solidFill>
+                  <a:srgbClr val="FF0000"/>
+                </a:solidFill>
+                <a:highlight>
+                  <a:srgbClr val="FFFF00"/>
+                </a:highlight>
+                <a:sym typeface="Wingdings" panose="05000000000000000000" pitchFamily="2" charset="2"/>
+              </a:rPr>
+              <a:t></a:t>
+            </a:r>
+            <a:r>
+              <a:rPr lang="en-US" sz="2800" dirty="0">
+                <a:solidFill>
+                  <a:srgbClr val="FF0000"/>
+                </a:solidFill>
+                <a:highlight>
+                  <a:srgbClr val="FFFF00"/>
+                </a:highlight>
+              </a:rPr>
+              <a:t> </a:t>
+            </a:r>
+            <a:r>
+              <a:rPr lang="en-US" sz="2800" dirty="0">
+                <a:solidFill>
+                  <a:srgbClr val="FF0000"/>
+                </a:solidFill>
+                <a:highlight>
+                  <a:srgbClr val="FFFF00"/>
+                </a:highlight>
+                <a:sym typeface="Wingdings" panose="05000000000000000000" pitchFamily="2" charset="2"/>
+              </a:rPr>
+              <a:t></a:t>
+            </a:r>
+            <a:r>
+              <a:rPr lang="en-US" sz="2800" dirty="0">
+                <a:solidFill>
+                  <a:srgbClr val="FF0000"/>
+                </a:solidFill>
+                <a:highlight>
+                  <a:srgbClr val="FFFF00"/>
+                </a:highlight>
+              </a:rPr>
+              <a:t> </a:t>
+            </a:r>
+            <a:r>
+              <a:rPr lang="en-US" sz="2800" dirty="0">
+                <a:solidFill>
+                  <a:srgbClr val="FF0000"/>
+                </a:solidFill>
+                <a:highlight>
+                  <a:srgbClr val="FFFF00"/>
+                </a:highlight>
+                <a:sym typeface="Wingdings" panose="05000000000000000000" pitchFamily="2" charset="2"/>
+              </a:rPr>
+              <a:t> </a:t>
+            </a:r>
+            <a:endParaRPr lang="en-IN" sz="2800" dirty="0">
+              <a:solidFill>
+                <a:srgbClr val="FF0000"/>
+              </a:solidFill>
+              <a:highlight>
+                <a:srgbClr val="FFFF00"/>
+              </a:highlight>
+            </a:endParaRPr>
+          </a:p>
+        </p:txBody>
+      </p:sp>
+      <p:sp>
+        <p:nvSpPr>
+          <p:cNvPr id="6" name="TextBox 5">
+            <a:extLst>
+              <a:ext uri="{FF2B5EF4-FFF2-40B4-BE49-F238E27FC236}">
+                <a16:creationId xmlns:a16="http://schemas.microsoft.com/office/drawing/2014/main" id="{997DD09D-F8F7-8B40-6A46-D1007240C2C0}"/>
+              </a:ext>
+            </a:extLst>
+          </p:cNvPr>
+          <p:cNvSpPr txBox="1"/>
+          <p:nvPr/>
+        </p:nvSpPr>
+        <p:spPr>
+          <a:xfrm>
+            <a:off x="311726" y="820655"/>
+            <a:ext cx="11568546" cy="1754326"/>
+          </a:xfrm>
+          <a:prstGeom prst="rect">
+            <a:avLst/>
+          </a:prstGeom>
+          <a:solidFill>
+            <a:srgbClr val="00B050"/>
+          </a:solidFill>
+        </p:spPr>
+        <p:txBody>
+          <a:bodyPr wrap="square" rtlCol="0">
+            <a:spAutoFit/>
+          </a:bodyPr>
+          <a:lstStyle/>
+          <a:p>
+            <a:r>
+              <a:rPr lang="en-US" b="1" dirty="0">
+                <a:solidFill>
+                  <a:schemeClr val="bg1"/>
+                </a:solidFill>
+                <a:latin typeface="Fira Code" panose="020B0809050000020004" pitchFamily="49" charset="0"/>
+                <a:ea typeface="Fira Code" panose="020B0809050000020004" pitchFamily="49" charset="0"/>
+                <a:cs typeface="Fira Code" panose="020B0809050000020004" pitchFamily="49" charset="0"/>
+              </a:rPr>
+              <a:t>Importing useSelector and useDispatch hook : useSelector hook is used to access the data from redux store and useDispatch hook is used to dispatch the action which will change the state. (whenever a action is dispatched by the useDispatch hook, reducer receives the type of that action and then depending upon the type of the action it changes the state based on our given condition and updates the latest state inside the store)</a:t>
+            </a:r>
+            <a:endParaRPr lang="en-IN" dirty="0">
+              <a:solidFill>
+                <a:schemeClr val="bg1"/>
+              </a:solidFill>
+              <a:latin typeface="Fira Code" panose="020B0809050000020004" pitchFamily="49" charset="0"/>
+              <a:ea typeface="Fira Code" panose="020B0809050000020004" pitchFamily="49" charset="0"/>
+              <a:cs typeface="Fira Code" panose="020B0809050000020004" pitchFamily="49" charset="0"/>
+            </a:endParaRPr>
+          </a:p>
+        </p:txBody>
+      </p:sp>
+      <p:sp>
+        <p:nvSpPr>
+          <p:cNvPr id="7" name="TextBox 6">
+            <a:extLst>
+              <a:ext uri="{FF2B5EF4-FFF2-40B4-BE49-F238E27FC236}">
+                <a16:creationId xmlns:a16="http://schemas.microsoft.com/office/drawing/2014/main" id="{4A5EBA0F-B248-3DD1-F909-AAF5D7404ADC}"/>
+              </a:ext>
+            </a:extLst>
+          </p:cNvPr>
+          <p:cNvSpPr txBox="1"/>
+          <p:nvPr/>
+        </p:nvSpPr>
+        <p:spPr>
+          <a:xfrm>
+            <a:off x="76199" y="2738159"/>
             <a:ext cx="12039600" cy="3046988"/>
           </a:xfrm>
           <a:prstGeom prst="rect">

</xml_diff>